<commit_message>
Abstract factory and interface class
</commit_message>
<xml_diff>
--- a/6044_FramPat/D2D/W03/INFO_6044_Inheritance.pptx
+++ b/6044_FramPat/D2D/W03/INFO_6044_Inheritance.pptx
@@ -5,13 +5,28 @@
     <p:sldMasterId id="2147483892" r:id="rId1"/>
   </p:sldMasterIdLst>
   <p:notesMasterIdLst>
-    <p:notesMasterId r:id="rId6"/>
+    <p:notesMasterId r:id="rId21"/>
   </p:notesMasterIdLst>
   <p:sldIdLst>
     <p:sldId id="256" r:id="rId2"/>
     <p:sldId id="296" r:id="rId3"/>
     <p:sldId id="311" r:id="rId4"/>
     <p:sldId id="312" r:id="rId5"/>
+    <p:sldId id="313" r:id="rId6"/>
+    <p:sldId id="314" r:id="rId7"/>
+    <p:sldId id="316" r:id="rId8"/>
+    <p:sldId id="317" r:id="rId9"/>
+    <p:sldId id="318" r:id="rId10"/>
+    <p:sldId id="315" r:id="rId11"/>
+    <p:sldId id="319" r:id="rId12"/>
+    <p:sldId id="320" r:id="rId13"/>
+    <p:sldId id="322" r:id="rId14"/>
+    <p:sldId id="321" r:id="rId15"/>
+    <p:sldId id="323" r:id="rId16"/>
+    <p:sldId id="324" r:id="rId17"/>
+    <p:sldId id="325" r:id="rId18"/>
+    <p:sldId id="326" r:id="rId19"/>
+    <p:sldId id="327" r:id="rId20"/>
   </p:sldIdLst>
   <p:sldSz cx="9144000" cy="5143500" type="screen16x9"/>
   <p:notesSz cx="6858000" cy="9144000"/>
@@ -212,7 +227,7 @@
             <a:fld id="{3D3F9196-5FBD-45F8-86BD-A3D90AC79AC7}" type="datetimeFigureOut">
               <a:rPr lang="en-CA" smtClean="0"/>
               <a:pPr/>
-              <a:t>2024-09-30</a:t>
+              <a:t>2024-10-07</a:t>
             </a:fld>
             <a:endParaRPr lang="en-CA"/>
           </a:p>
@@ -513,7 +528,7 @@
             <a:fld id="{8F6BCBE8-30B0-4476-8762-9236B142003A}" type="datetimeFigureOut">
               <a:rPr lang="en-US" smtClean="0"/>
               <a:pPr/>
-              <a:t>9/30/2024</a:t>
+              <a:t>10/7/2024</a:t>
             </a:fld>
             <a:endParaRPr lang="en-US" sz="1100" dirty="0">
               <a:solidFill>
@@ -1210,7 +1225,7 @@
             <a:fld id="{8F6BCBE8-30B0-4476-8762-9236B142003A}" type="datetimeFigureOut">
               <a:rPr lang="en-US" smtClean="0"/>
               <a:pPr/>
-              <a:t>9/30/2024</a:t>
+              <a:t>10/7/2024</a:t>
             </a:fld>
             <a:endParaRPr lang="en-US" sz="1100" dirty="0">
               <a:solidFill>
@@ -1395,7 +1410,7 @@
             <a:fld id="{8F6BCBE8-30B0-4476-8762-9236B142003A}" type="datetimeFigureOut">
               <a:rPr lang="en-US" smtClean="0"/>
               <a:pPr/>
-              <a:t>9/30/2024</a:t>
+              <a:t>10/7/2024</a:t>
             </a:fld>
             <a:endParaRPr lang="en-US" sz="1100" dirty="0">
               <a:solidFill>
@@ -1570,7 +1585,7 @@
             <a:fld id="{8F6BCBE8-30B0-4476-8762-9236B142003A}" type="datetimeFigureOut">
               <a:rPr lang="en-US" smtClean="0"/>
               <a:pPr/>
-              <a:t>9/30/2024</a:t>
+              <a:t>10/7/2024</a:t>
             </a:fld>
             <a:endParaRPr lang="en-US" sz="1100" dirty="0">
               <a:solidFill>
@@ -3028,7 +3043,7 @@
             <a:fld id="{8F6BCBE8-30B0-4476-8762-9236B142003A}" type="datetimeFigureOut">
               <a:rPr lang="en-US" smtClean="0"/>
               <a:pPr/>
-              <a:t>9/30/2024</a:t>
+              <a:t>10/7/2024</a:t>
             </a:fld>
             <a:endParaRPr lang="en-US" sz="1100" dirty="0">
               <a:solidFill>
@@ -3617,7 +3632,7 @@
             <a:fld id="{8F6BCBE8-30B0-4476-8762-9236B142003A}" type="datetimeFigureOut">
               <a:rPr lang="en-US" smtClean="0"/>
               <a:pPr/>
-              <a:t>9/30/2024</a:t>
+              <a:t>10/7/2024</a:t>
             </a:fld>
             <a:endParaRPr lang="en-US" sz="1100" dirty="0">
               <a:solidFill>
@@ -4056,7 +4071,7 @@
             <a:fld id="{8F6BCBE8-30B0-4476-8762-9236B142003A}" type="datetimeFigureOut">
               <a:rPr lang="en-US" smtClean="0"/>
               <a:pPr/>
-              <a:t>9/30/2024</a:t>
+              <a:t>10/7/2024</a:t>
             </a:fld>
             <a:endParaRPr lang="en-US" sz="1100" dirty="0">
               <a:solidFill>
@@ -4603,7 +4618,7 @@
             <a:fld id="{8F6BCBE8-30B0-4476-8762-9236B142003A}" type="datetimeFigureOut">
               <a:rPr lang="en-US" smtClean="0"/>
               <a:pPr/>
-              <a:t>9/30/2024</a:t>
+              <a:t>10/7/2024</a:t>
             </a:fld>
             <a:endParaRPr lang="en-US" sz="1100" dirty="0">
               <a:solidFill>
@@ -4704,7 +4719,7 @@
             <a:fld id="{8F6BCBE8-30B0-4476-8762-9236B142003A}" type="datetimeFigureOut">
               <a:rPr lang="en-US" smtClean="0"/>
               <a:pPr/>
-              <a:t>9/30/2024</a:t>
+              <a:t>10/7/2024</a:t>
             </a:fld>
             <a:endParaRPr lang="en-US" sz="1100" dirty="0">
               <a:solidFill>
@@ -4962,7 +4977,7 @@
             <a:fld id="{8F6BCBE8-30B0-4476-8762-9236B142003A}" type="datetimeFigureOut">
               <a:rPr lang="en-US" smtClean="0"/>
               <a:pPr/>
-              <a:t>9/30/2024</a:t>
+              <a:t>10/7/2024</a:t>
             </a:fld>
             <a:endParaRPr lang="en-US" sz="1100" dirty="0">
               <a:solidFill>
@@ -5684,7 +5699,7 @@
             <a:fld id="{8F6BCBE8-30B0-4476-8762-9236B142003A}" type="datetimeFigureOut">
               <a:rPr lang="en-US" smtClean="0"/>
               <a:pPr/>
-              <a:t>9/30/2024</a:t>
+              <a:t>10/7/2024</a:t>
             </a:fld>
             <a:endParaRPr lang="en-US" sz="1100" dirty="0">
               <a:solidFill>
@@ -6340,7 +6355,7 @@
             <a:fld id="{8F6BCBE8-30B0-4476-8762-9236B142003A}" type="datetimeFigureOut">
               <a:rPr lang="en-US" smtClean="0"/>
               <a:pPr/>
-              <a:t>9/30/2024</a:t>
+              <a:t>10/7/2024</a:t>
             </a:fld>
             <a:endParaRPr lang="en-US" sz="1100" dirty="0">
               <a:solidFill>
@@ -6856,6 +6871,3324 @@
   <p:clrMapOvr>
     <a:masterClrMapping/>
   </p:clrMapOvr>
+</p:sld>
+</file>
+
+<file path=ppt/slides/slide10.xml><?xml version="1.0" encoding="utf-8"?>
+<p:sld xmlns:a="http://schemas.openxmlformats.org/drawingml/2006/main" xmlns:r="http://schemas.openxmlformats.org/officeDocument/2006/relationships" xmlns:p="http://schemas.openxmlformats.org/presentationml/2006/main">
+  <p:cSld>
+    <p:spTree>
+      <p:nvGrpSpPr>
+        <p:cNvPr id="1" name=""/>
+        <p:cNvGrpSpPr/>
+        <p:nvPr/>
+      </p:nvGrpSpPr>
+      <p:grpSpPr>
+        <a:xfrm>
+          <a:off x="0" y="0"/>
+          <a:ext cx="0" cy="0"/>
+          <a:chOff x="0" y="0"/>
+          <a:chExt cx="0" cy="0"/>
+        </a:xfrm>
+      </p:grpSpPr>
+      <p:sp>
+        <p:nvSpPr>
+          <p:cNvPr id="2" name="Title 1"/>
+          <p:cNvSpPr>
+            <a:spLocks noGrp="1"/>
+          </p:cNvSpPr>
+          <p:nvPr>
+            <p:ph type="title"/>
+          </p:nvPr>
+        </p:nvSpPr>
+        <p:spPr>
+          <a:xfrm>
+            <a:off x="914400" y="384048"/>
+            <a:ext cx="7772400" cy="968502"/>
+          </a:xfrm>
+        </p:spPr>
+        <p:txBody>
+          <a:bodyPr/>
+          <a:lstStyle/>
+          <a:p>
+            <a:r>
+              <a:rPr lang="en-CA" dirty="0"/>
+              <a:t>BEWARE!</a:t>
+            </a:r>
+          </a:p>
+        </p:txBody>
+      </p:sp>
+      <p:sp>
+        <p:nvSpPr>
+          <p:cNvPr id="3" name="Content Placeholder 2"/>
+          <p:cNvSpPr>
+            <a:spLocks noGrp="1"/>
+          </p:cNvSpPr>
+          <p:nvPr>
+            <p:ph idx="1"/>
+          </p:nvPr>
+        </p:nvSpPr>
+        <p:spPr>
+          <a:xfrm>
+            <a:off x="304800" y="1428750"/>
+            <a:ext cx="8839200" cy="3337920"/>
+          </a:xfrm>
+        </p:spPr>
+        <p:txBody>
+          <a:bodyPr>
+            <a:normAutofit/>
+          </a:bodyPr>
+          <a:lstStyle/>
+          <a:p>
+            <a:r>
+              <a:rPr lang="en-CA" dirty="0"/>
+              <a:t>You can mix and match these one method at a time.</a:t>
+            </a:r>
+          </a:p>
+          <a:p>
+            <a:r>
+              <a:rPr lang="en-CA" dirty="0"/>
+              <a:t>Whatever method has “virtual” in front becomes polymorphic BUT if there’s a method that DOESN’T have “virtual”, it ISN’T polymorphic and whatever type your variable is </a:t>
+            </a:r>
+            <a:r>
+              <a:rPr lang="en-CA" dirty="0">
+                <a:sym typeface="Wingdings" panose="05000000000000000000" pitchFamily="2" charset="2"/>
+              </a:rPr>
+              <a:t> that’s the method that’s called.</a:t>
+            </a:r>
+            <a:endParaRPr lang="en-CA" dirty="0"/>
+          </a:p>
+        </p:txBody>
+      </p:sp>
+      <p:sp>
+        <p:nvSpPr>
+          <p:cNvPr id="4" name="AutoShape 6"/>
+          <p:cNvSpPr>
+            <a:spLocks noChangeArrowheads="1"/>
+          </p:cNvSpPr>
+          <p:nvPr/>
+        </p:nvSpPr>
+        <p:spPr bwMode="auto">
+          <a:xfrm>
+            <a:off x="8534400" y="4800600"/>
+            <a:ext cx="609600" cy="342900"/>
+          </a:xfrm>
+          <a:prstGeom prst="rightArrow">
+            <a:avLst>
+              <a:gd name="adj1" fmla="val 50000"/>
+              <a:gd name="adj2" fmla="val 33333"/>
+            </a:avLst>
+          </a:prstGeom>
+          <a:noFill/>
+          <a:ln w="19050">
+            <a:solidFill>
+              <a:srgbClr val="969696"/>
+            </a:solidFill>
+            <a:miter lim="800000"/>
+            <a:headEnd/>
+            <a:tailEnd/>
+          </a:ln>
+        </p:spPr>
+        <p:txBody>
+          <a:bodyPr wrap="none" anchor="ctr"/>
+          <a:lstStyle/>
+          <a:p>
+            <a:endParaRPr lang="en-CA"/>
+          </a:p>
+        </p:txBody>
+      </p:sp>
+    </p:spTree>
+    <p:extLst>
+      <p:ext uri="{BB962C8B-B14F-4D97-AF65-F5344CB8AC3E}">
+        <p14:creationId xmlns:p14="http://schemas.microsoft.com/office/powerpoint/2010/main" val="3244476299"/>
+      </p:ext>
+    </p:extLst>
+  </p:cSld>
+  <p:clrMapOvr>
+    <a:masterClrMapping/>
+  </p:clrMapOvr>
+  <p:timing>
+    <p:tnLst>
+      <p:par>
+        <p:cTn id="1" dur="indefinite" restart="never" nodeType="tmRoot">
+          <p:childTnLst>
+            <p:seq concurrent="1" nextAc="seek">
+              <p:cTn id="2" dur="indefinite" nodeType="mainSeq">
+                <p:childTnLst>
+                  <p:par>
+                    <p:cTn id="3" fill="hold">
+                      <p:stCondLst>
+                        <p:cond delay="indefinite"/>
+                      </p:stCondLst>
+                      <p:childTnLst>
+                        <p:par>
+                          <p:cTn id="4" fill="hold">
+                            <p:stCondLst>
+                              <p:cond delay="0"/>
+                            </p:stCondLst>
+                            <p:childTnLst>
+                              <p:par>
+                                <p:cTn id="5" presetID="10" presetClass="entr" presetSubtype="0" fill="hold" grpId="0" nodeType="clickEffect">
+                                  <p:stCondLst>
+                                    <p:cond delay="0"/>
+                                  </p:stCondLst>
+                                  <p:childTnLst>
+                                    <p:set>
+                                      <p:cBhvr>
+                                        <p:cTn id="6" dur="1" fill="hold">
+                                          <p:stCondLst>
+                                            <p:cond delay="0"/>
+                                          </p:stCondLst>
+                                        </p:cTn>
+                                        <p:tgtEl>
+                                          <p:spTgt spid="4"/>
+                                        </p:tgtEl>
+                                        <p:attrNameLst>
+                                          <p:attrName>style.visibility</p:attrName>
+                                        </p:attrNameLst>
+                                      </p:cBhvr>
+                                      <p:to>
+                                        <p:strVal val="visible"/>
+                                      </p:to>
+                                    </p:set>
+                                    <p:animEffect transition="in" filter="fade">
+                                      <p:cBhvr>
+                                        <p:cTn id="7" dur="500"/>
+                                        <p:tgtEl>
+                                          <p:spTgt spid="4"/>
+                                        </p:tgtEl>
+                                      </p:cBhvr>
+                                    </p:animEffect>
+                                  </p:childTnLst>
+                                </p:cTn>
+                              </p:par>
+                            </p:childTnLst>
+                          </p:cTn>
+                        </p:par>
+                      </p:childTnLst>
+                    </p:cTn>
+                  </p:par>
+                </p:childTnLst>
+              </p:cTn>
+              <p:prevCondLst>
+                <p:cond evt="onPrev" delay="0">
+                  <p:tgtEl>
+                    <p:sldTgt/>
+                  </p:tgtEl>
+                </p:cond>
+              </p:prevCondLst>
+              <p:nextCondLst>
+                <p:cond evt="onNext" delay="0">
+                  <p:tgtEl>
+                    <p:sldTgt/>
+                  </p:tgtEl>
+                </p:cond>
+              </p:nextCondLst>
+            </p:seq>
+          </p:childTnLst>
+        </p:cTn>
+      </p:par>
+    </p:tnLst>
+    <p:bldLst>
+      <p:bldP spid="4" grpId="0" animBg="1"/>
+    </p:bldLst>
+  </p:timing>
+</p:sld>
+</file>
+
+<file path=ppt/slides/slide11.xml><?xml version="1.0" encoding="utf-8"?>
+<p:sld xmlns:a="http://schemas.openxmlformats.org/drawingml/2006/main" xmlns:r="http://schemas.openxmlformats.org/officeDocument/2006/relationships" xmlns:p="http://schemas.openxmlformats.org/presentationml/2006/main">
+  <p:cSld>
+    <p:spTree>
+      <p:nvGrpSpPr>
+        <p:cNvPr id="1" name=""/>
+        <p:cNvGrpSpPr/>
+        <p:nvPr/>
+      </p:nvGrpSpPr>
+      <p:grpSpPr>
+        <a:xfrm>
+          <a:off x="0" y="0"/>
+          <a:ext cx="0" cy="0"/>
+          <a:chOff x="0" y="0"/>
+          <a:chExt cx="0" cy="0"/>
+        </a:xfrm>
+      </p:grpSpPr>
+      <p:sp>
+        <p:nvSpPr>
+          <p:cNvPr id="2" name="Title 1"/>
+          <p:cNvSpPr>
+            <a:spLocks noGrp="1"/>
+          </p:cNvSpPr>
+          <p:nvPr>
+            <p:ph type="title"/>
+          </p:nvPr>
+        </p:nvSpPr>
+        <p:spPr>
+          <a:xfrm>
+            <a:off x="914400" y="384048"/>
+            <a:ext cx="7772400" cy="968502"/>
+          </a:xfrm>
+        </p:spPr>
+        <p:txBody>
+          <a:bodyPr/>
+          <a:lstStyle/>
+          <a:p>
+            <a:r>
+              <a:rPr lang="en-CA" dirty="0"/>
+              <a:t>Multiple inheritance</a:t>
+            </a:r>
+          </a:p>
+        </p:txBody>
+      </p:sp>
+      <p:sp>
+        <p:nvSpPr>
+          <p:cNvPr id="3" name="Content Placeholder 2"/>
+          <p:cNvSpPr>
+            <a:spLocks noGrp="1"/>
+          </p:cNvSpPr>
+          <p:nvPr>
+            <p:ph idx="1"/>
+          </p:nvPr>
+        </p:nvSpPr>
+        <p:spPr>
+          <a:xfrm>
+            <a:off x="304800" y="1428750"/>
+            <a:ext cx="8839200" cy="3337920"/>
+          </a:xfrm>
+        </p:spPr>
+        <p:txBody>
+          <a:bodyPr>
+            <a:normAutofit/>
+          </a:bodyPr>
+          <a:lstStyle/>
+          <a:p>
+            <a:r>
+              <a:rPr lang="en-CA" strike="dblStrike" dirty="0"/>
+              <a:t>Ryan</a:t>
+            </a:r>
+            <a:r>
+              <a:rPr lang="en-CA" dirty="0"/>
+              <a:t> James Gosling says that multiple inheritance is the Work of The Devil.</a:t>
+            </a:r>
+          </a:p>
+          <a:p>
+            <a:r>
+              <a:rPr lang="en-CA" dirty="0"/>
+              <a:t>But what is it? </a:t>
+            </a:r>
+          </a:p>
+          <a:p>
+            <a:r>
+              <a:rPr lang="en-CA" dirty="0"/>
+              <a:t>And is it pure evil?? </a:t>
+            </a:r>
+          </a:p>
+        </p:txBody>
+      </p:sp>
+      <p:sp>
+        <p:nvSpPr>
+          <p:cNvPr id="4" name="AutoShape 6"/>
+          <p:cNvSpPr>
+            <a:spLocks noChangeArrowheads="1"/>
+          </p:cNvSpPr>
+          <p:nvPr/>
+        </p:nvSpPr>
+        <p:spPr bwMode="auto">
+          <a:xfrm>
+            <a:off x="8534400" y="4800600"/>
+            <a:ext cx="609600" cy="342900"/>
+          </a:xfrm>
+          <a:prstGeom prst="rightArrow">
+            <a:avLst>
+              <a:gd name="adj1" fmla="val 50000"/>
+              <a:gd name="adj2" fmla="val 33333"/>
+            </a:avLst>
+          </a:prstGeom>
+          <a:noFill/>
+          <a:ln w="19050">
+            <a:solidFill>
+              <a:srgbClr val="969696"/>
+            </a:solidFill>
+            <a:miter lim="800000"/>
+            <a:headEnd/>
+            <a:tailEnd/>
+          </a:ln>
+        </p:spPr>
+        <p:txBody>
+          <a:bodyPr wrap="none" anchor="ctr"/>
+          <a:lstStyle/>
+          <a:p>
+            <a:endParaRPr lang="en-CA"/>
+          </a:p>
+        </p:txBody>
+      </p:sp>
+    </p:spTree>
+    <p:extLst>
+      <p:ext uri="{BB962C8B-B14F-4D97-AF65-F5344CB8AC3E}">
+        <p14:creationId xmlns:p14="http://schemas.microsoft.com/office/powerpoint/2010/main" val="3200311052"/>
+      </p:ext>
+    </p:extLst>
+  </p:cSld>
+  <p:clrMapOvr>
+    <a:masterClrMapping/>
+  </p:clrMapOvr>
+  <p:timing>
+    <p:tnLst>
+      <p:par>
+        <p:cTn id="1" dur="indefinite" restart="never" nodeType="tmRoot">
+          <p:childTnLst>
+            <p:seq concurrent="1" nextAc="seek">
+              <p:cTn id="2" dur="indefinite" nodeType="mainSeq">
+                <p:childTnLst>
+                  <p:par>
+                    <p:cTn id="3" fill="hold">
+                      <p:stCondLst>
+                        <p:cond delay="indefinite"/>
+                      </p:stCondLst>
+                      <p:childTnLst>
+                        <p:par>
+                          <p:cTn id="4" fill="hold">
+                            <p:stCondLst>
+                              <p:cond delay="0"/>
+                            </p:stCondLst>
+                            <p:childTnLst>
+                              <p:par>
+                                <p:cTn id="5" presetID="10" presetClass="entr" presetSubtype="0" fill="hold" grpId="0" nodeType="clickEffect">
+                                  <p:stCondLst>
+                                    <p:cond delay="0"/>
+                                  </p:stCondLst>
+                                  <p:childTnLst>
+                                    <p:set>
+                                      <p:cBhvr>
+                                        <p:cTn id="6" dur="1" fill="hold">
+                                          <p:stCondLst>
+                                            <p:cond delay="0"/>
+                                          </p:stCondLst>
+                                        </p:cTn>
+                                        <p:tgtEl>
+                                          <p:spTgt spid="4"/>
+                                        </p:tgtEl>
+                                        <p:attrNameLst>
+                                          <p:attrName>style.visibility</p:attrName>
+                                        </p:attrNameLst>
+                                      </p:cBhvr>
+                                      <p:to>
+                                        <p:strVal val="visible"/>
+                                      </p:to>
+                                    </p:set>
+                                    <p:animEffect transition="in" filter="fade">
+                                      <p:cBhvr>
+                                        <p:cTn id="7" dur="500"/>
+                                        <p:tgtEl>
+                                          <p:spTgt spid="4"/>
+                                        </p:tgtEl>
+                                      </p:cBhvr>
+                                    </p:animEffect>
+                                  </p:childTnLst>
+                                </p:cTn>
+                              </p:par>
+                            </p:childTnLst>
+                          </p:cTn>
+                        </p:par>
+                      </p:childTnLst>
+                    </p:cTn>
+                  </p:par>
+                </p:childTnLst>
+              </p:cTn>
+              <p:prevCondLst>
+                <p:cond evt="onPrev" delay="0">
+                  <p:tgtEl>
+                    <p:sldTgt/>
+                  </p:tgtEl>
+                </p:cond>
+              </p:prevCondLst>
+              <p:nextCondLst>
+                <p:cond evt="onNext" delay="0">
+                  <p:tgtEl>
+                    <p:sldTgt/>
+                  </p:tgtEl>
+                </p:cond>
+              </p:nextCondLst>
+            </p:seq>
+          </p:childTnLst>
+        </p:cTn>
+      </p:par>
+    </p:tnLst>
+    <p:bldLst>
+      <p:bldP spid="4" grpId="0" animBg="1"/>
+    </p:bldLst>
+  </p:timing>
+</p:sld>
+</file>
+
+<file path=ppt/slides/slide12.xml><?xml version="1.0" encoding="utf-8"?>
+<p:sld xmlns:a="http://schemas.openxmlformats.org/drawingml/2006/main" xmlns:r="http://schemas.openxmlformats.org/officeDocument/2006/relationships" xmlns:p="http://schemas.openxmlformats.org/presentationml/2006/main" show="0">
+  <p:cSld>
+    <p:spTree>
+      <p:nvGrpSpPr>
+        <p:cNvPr id="1" name=""/>
+        <p:cNvGrpSpPr/>
+        <p:nvPr/>
+      </p:nvGrpSpPr>
+      <p:grpSpPr>
+        <a:xfrm>
+          <a:off x="0" y="0"/>
+          <a:ext cx="0" cy="0"/>
+          <a:chOff x="0" y="0"/>
+          <a:chExt cx="0" cy="0"/>
+        </a:xfrm>
+      </p:grpSpPr>
+      <p:sp>
+        <p:nvSpPr>
+          <p:cNvPr id="4" name="Rectangle: Rounded Corners 3">
+            <a:extLst>
+              <a:ext uri="{FF2B5EF4-FFF2-40B4-BE49-F238E27FC236}">
+                <a16:creationId xmlns:a16="http://schemas.microsoft.com/office/drawing/2014/main" id="{89221DBB-76DB-4E50-86EB-54D316A8F940}"/>
+              </a:ext>
+            </a:extLst>
+          </p:cNvPr>
+          <p:cNvSpPr/>
+          <p:nvPr/>
+        </p:nvSpPr>
+        <p:spPr>
+          <a:xfrm>
+            <a:off x="3733800" y="209550"/>
+            <a:ext cx="1676400" cy="1066800"/>
+          </a:xfrm>
+          <a:prstGeom prst="roundRect">
+            <a:avLst/>
+          </a:prstGeom>
+        </p:spPr>
+        <p:style>
+          <a:lnRef idx="1">
+            <a:schemeClr val="accent6"/>
+          </a:lnRef>
+          <a:fillRef idx="3">
+            <a:schemeClr val="accent6"/>
+          </a:fillRef>
+          <a:effectRef idx="2">
+            <a:schemeClr val="accent6"/>
+          </a:effectRef>
+          <a:fontRef idx="minor">
+            <a:schemeClr val="lt1"/>
+          </a:fontRef>
+        </p:style>
+        <p:txBody>
+          <a:bodyPr rtlCol="0" anchor="ctr"/>
+          <a:lstStyle/>
+          <a:p>
+            <a:pPr algn="ctr"/>
+            <a:r>
+              <a:rPr lang="en-US" dirty="0">
+                <a:solidFill>
+                  <a:schemeClr val="bg1"/>
+                </a:solidFill>
+              </a:rPr>
+              <a:t>Monster</a:t>
+            </a:r>
+          </a:p>
+          <a:p>
+            <a:pPr algn="ctr"/>
+            <a:r>
+              <a:rPr lang="en-US" dirty="0" err="1">
+                <a:solidFill>
+                  <a:schemeClr val="bg1"/>
+                </a:solidFill>
+              </a:rPr>
+              <a:t>locationXYZ</a:t>
+            </a:r>
+            <a:endParaRPr lang="en-CA" dirty="0">
+              <a:solidFill>
+                <a:schemeClr val="bg1"/>
+              </a:solidFill>
+            </a:endParaRPr>
+          </a:p>
+        </p:txBody>
+      </p:sp>
+      <p:sp>
+        <p:nvSpPr>
+          <p:cNvPr id="5" name="Rectangle: Rounded Corners 4">
+            <a:extLst>
+              <a:ext uri="{FF2B5EF4-FFF2-40B4-BE49-F238E27FC236}">
+                <a16:creationId xmlns:a16="http://schemas.microsoft.com/office/drawing/2014/main" id="{8089A44A-CE32-4FA9-9927-6F765FF48FF6}"/>
+              </a:ext>
+            </a:extLst>
+          </p:cNvPr>
+          <p:cNvSpPr/>
+          <p:nvPr/>
+        </p:nvSpPr>
+        <p:spPr>
+          <a:xfrm>
+            <a:off x="1295400" y="2038350"/>
+            <a:ext cx="1905000" cy="1066800"/>
+          </a:xfrm>
+          <a:prstGeom prst="roundRect">
+            <a:avLst/>
+          </a:prstGeom>
+        </p:spPr>
+        <p:style>
+          <a:lnRef idx="2">
+            <a:schemeClr val="accent1">
+              <a:shade val="50000"/>
+            </a:schemeClr>
+          </a:lnRef>
+          <a:fillRef idx="1">
+            <a:schemeClr val="accent1"/>
+          </a:fillRef>
+          <a:effectRef idx="0">
+            <a:schemeClr val="accent1"/>
+          </a:effectRef>
+          <a:fontRef idx="minor">
+            <a:schemeClr val="lt1"/>
+          </a:fontRef>
+        </p:style>
+        <p:txBody>
+          <a:bodyPr rtlCol="0" anchor="ctr"/>
+          <a:lstStyle/>
+          <a:p>
+            <a:pPr algn="ctr"/>
+            <a:r>
+              <a:rPr lang="en-US" dirty="0" err="1">
+                <a:solidFill>
+                  <a:schemeClr val="bg1"/>
+                </a:solidFill>
+              </a:rPr>
+              <a:t>cSuperMonster</a:t>
+            </a:r>
+            <a:endParaRPr lang="en-US" dirty="0">
+              <a:solidFill>
+                <a:schemeClr val="bg1"/>
+              </a:solidFill>
+            </a:endParaRPr>
+          </a:p>
+          <a:p>
+            <a:pPr algn="ctr"/>
+            <a:r>
+              <a:rPr lang="en-US" dirty="0">
+                <a:solidFill>
+                  <a:schemeClr val="bg1"/>
+                </a:solidFill>
+              </a:rPr>
+              <a:t>(</a:t>
+            </a:r>
+            <a:r>
+              <a:rPr lang="en-US" dirty="0" err="1">
+                <a:solidFill>
+                  <a:schemeClr val="bg1"/>
+                </a:solidFill>
+              </a:rPr>
+              <a:t>GiveBirth</a:t>
+            </a:r>
+            <a:r>
+              <a:rPr lang="en-US" dirty="0">
+                <a:solidFill>
+                  <a:schemeClr val="bg1"/>
+                </a:solidFill>
+              </a:rPr>
+              <a:t>)</a:t>
+            </a:r>
+            <a:endParaRPr lang="en-CA" dirty="0">
+              <a:solidFill>
+                <a:schemeClr val="bg1"/>
+              </a:solidFill>
+            </a:endParaRPr>
+          </a:p>
+        </p:txBody>
+      </p:sp>
+      <p:cxnSp>
+        <p:nvCxnSpPr>
+          <p:cNvPr id="16" name="Straight Arrow Connector 15">
+            <a:extLst>
+              <a:ext uri="{FF2B5EF4-FFF2-40B4-BE49-F238E27FC236}">
+                <a16:creationId xmlns:a16="http://schemas.microsoft.com/office/drawing/2014/main" id="{500FB6B0-AEE8-475A-A08A-29555711939A}"/>
+              </a:ext>
+            </a:extLst>
+          </p:cNvPr>
+          <p:cNvCxnSpPr>
+            <a:cxnSpLocks/>
+            <a:stCxn id="5" idx="0"/>
+            <a:endCxn id="4" idx="2"/>
+          </p:cNvCxnSpPr>
+          <p:nvPr/>
+        </p:nvCxnSpPr>
+        <p:spPr>
+          <a:xfrm flipV="1">
+            <a:off x="2247900" y="1276350"/>
+            <a:ext cx="2324100" cy="762000"/>
+          </a:xfrm>
+          <a:prstGeom prst="straightConnector1">
+            <a:avLst/>
+          </a:prstGeom>
+          <a:ln w="76200">
+            <a:tailEnd type="triangle"/>
+          </a:ln>
+        </p:spPr>
+        <p:style>
+          <a:lnRef idx="1">
+            <a:schemeClr val="accent1"/>
+          </a:lnRef>
+          <a:fillRef idx="0">
+            <a:schemeClr val="accent1"/>
+          </a:fillRef>
+          <a:effectRef idx="0">
+            <a:schemeClr val="accent1"/>
+          </a:effectRef>
+          <a:fontRef idx="minor">
+            <a:schemeClr val="tx1"/>
+          </a:fontRef>
+        </p:style>
+      </p:cxnSp>
+      <p:sp>
+        <p:nvSpPr>
+          <p:cNvPr id="7" name="Rectangle: Rounded Corners 6">
+            <a:extLst>
+              <a:ext uri="{FF2B5EF4-FFF2-40B4-BE49-F238E27FC236}">
+                <a16:creationId xmlns:a16="http://schemas.microsoft.com/office/drawing/2014/main" id="{3A30A23A-55B1-27AA-5E4C-3AA4BBE41927}"/>
+              </a:ext>
+            </a:extLst>
+          </p:cNvPr>
+          <p:cNvSpPr/>
+          <p:nvPr/>
+        </p:nvSpPr>
+        <p:spPr>
+          <a:xfrm>
+            <a:off x="6096000" y="2038350"/>
+            <a:ext cx="1905000" cy="1066800"/>
+          </a:xfrm>
+          <a:prstGeom prst="roundRect">
+            <a:avLst/>
+          </a:prstGeom>
+        </p:spPr>
+        <p:style>
+          <a:lnRef idx="3">
+            <a:schemeClr val="lt1"/>
+          </a:lnRef>
+          <a:fillRef idx="1">
+            <a:schemeClr val="accent2"/>
+          </a:fillRef>
+          <a:effectRef idx="1">
+            <a:schemeClr val="accent2"/>
+          </a:effectRef>
+          <a:fontRef idx="minor">
+            <a:schemeClr val="lt1"/>
+          </a:fontRef>
+        </p:style>
+        <p:txBody>
+          <a:bodyPr rtlCol="0" anchor="ctr"/>
+          <a:lstStyle/>
+          <a:p>
+            <a:pPr algn="ctr"/>
+            <a:r>
+              <a:rPr lang="en-US" dirty="0" err="1">
+                <a:solidFill>
+                  <a:schemeClr val="bg1"/>
+                </a:solidFill>
+              </a:rPr>
+              <a:t>cFlyingMonster</a:t>
+            </a:r>
+            <a:endParaRPr lang="en-US" dirty="0">
+              <a:solidFill>
+                <a:schemeClr val="bg1"/>
+              </a:solidFill>
+            </a:endParaRPr>
+          </a:p>
+          <a:p>
+            <a:pPr algn="ctr"/>
+            <a:r>
+              <a:rPr lang="en-US" dirty="0">
+                <a:solidFill>
+                  <a:schemeClr val="bg1"/>
+                </a:solidFill>
+              </a:rPr>
+              <a:t>(Fly)</a:t>
+            </a:r>
+            <a:endParaRPr lang="en-CA" dirty="0">
+              <a:solidFill>
+                <a:schemeClr val="bg1"/>
+              </a:solidFill>
+            </a:endParaRPr>
+          </a:p>
+        </p:txBody>
+      </p:sp>
+      <p:cxnSp>
+        <p:nvCxnSpPr>
+          <p:cNvPr id="8" name="Straight Arrow Connector 7">
+            <a:extLst>
+              <a:ext uri="{FF2B5EF4-FFF2-40B4-BE49-F238E27FC236}">
+                <a16:creationId xmlns:a16="http://schemas.microsoft.com/office/drawing/2014/main" id="{D9430D04-A31E-D4AE-EC54-18744E112E7F}"/>
+              </a:ext>
+            </a:extLst>
+          </p:cNvPr>
+          <p:cNvCxnSpPr>
+            <a:cxnSpLocks/>
+            <a:stCxn id="7" idx="0"/>
+            <a:endCxn id="4" idx="2"/>
+          </p:cNvCxnSpPr>
+          <p:nvPr/>
+        </p:nvCxnSpPr>
+        <p:spPr>
+          <a:xfrm flipH="1" flipV="1">
+            <a:off x="4572000" y="1276350"/>
+            <a:ext cx="2476500" cy="762000"/>
+          </a:xfrm>
+          <a:prstGeom prst="straightConnector1">
+            <a:avLst/>
+          </a:prstGeom>
+          <a:ln w="76200">
+            <a:tailEnd type="triangle"/>
+          </a:ln>
+        </p:spPr>
+        <p:style>
+          <a:lnRef idx="1">
+            <a:schemeClr val="accent1"/>
+          </a:lnRef>
+          <a:fillRef idx="0">
+            <a:schemeClr val="accent1"/>
+          </a:fillRef>
+          <a:effectRef idx="0">
+            <a:schemeClr val="accent1"/>
+          </a:effectRef>
+          <a:fontRef idx="minor">
+            <a:schemeClr val="tx1"/>
+          </a:fontRef>
+        </p:style>
+      </p:cxnSp>
+      <p:sp>
+        <p:nvSpPr>
+          <p:cNvPr id="10" name="Rectangle: Rounded Corners 9">
+            <a:extLst>
+              <a:ext uri="{FF2B5EF4-FFF2-40B4-BE49-F238E27FC236}">
+                <a16:creationId xmlns:a16="http://schemas.microsoft.com/office/drawing/2014/main" id="{B6AF5040-D097-91B7-976D-BB4862FAA70D}"/>
+              </a:ext>
+            </a:extLst>
+          </p:cNvPr>
+          <p:cNvSpPr/>
+          <p:nvPr/>
+        </p:nvSpPr>
+        <p:spPr>
+          <a:xfrm>
+            <a:off x="3257550" y="3790950"/>
+            <a:ext cx="2628900" cy="1066800"/>
+          </a:xfrm>
+          <a:prstGeom prst="roundRect">
+            <a:avLst/>
+          </a:prstGeom>
+        </p:spPr>
+        <p:style>
+          <a:lnRef idx="2">
+            <a:schemeClr val="accent5">
+              <a:shade val="15000"/>
+            </a:schemeClr>
+          </a:lnRef>
+          <a:fillRef idx="1">
+            <a:schemeClr val="accent5"/>
+          </a:fillRef>
+          <a:effectRef idx="0">
+            <a:schemeClr val="accent5"/>
+          </a:effectRef>
+          <a:fontRef idx="minor">
+            <a:schemeClr val="lt1"/>
+          </a:fontRef>
+        </p:style>
+        <p:txBody>
+          <a:bodyPr rtlCol="0" anchor="ctr"/>
+          <a:lstStyle/>
+          <a:p>
+            <a:pPr algn="ctr"/>
+            <a:r>
+              <a:rPr lang="en-US" dirty="0" err="1">
+                <a:solidFill>
+                  <a:schemeClr val="bg1"/>
+                </a:solidFill>
+              </a:rPr>
+              <a:t>cSuperFlyingMonster</a:t>
+            </a:r>
+            <a:endParaRPr lang="en-US" dirty="0">
+              <a:solidFill>
+                <a:schemeClr val="bg1"/>
+              </a:solidFill>
+            </a:endParaRPr>
+          </a:p>
+          <a:p>
+            <a:pPr algn="ctr"/>
+            <a:r>
+              <a:rPr lang="en-US" dirty="0">
+                <a:solidFill>
+                  <a:schemeClr val="bg1"/>
+                </a:solidFill>
+              </a:rPr>
+              <a:t>(</a:t>
+            </a:r>
+            <a:r>
+              <a:rPr lang="en-US" dirty="0" err="1">
+                <a:solidFill>
+                  <a:schemeClr val="bg1"/>
+                </a:solidFill>
+              </a:rPr>
+              <a:t>GiveBirth</a:t>
+            </a:r>
+            <a:r>
+              <a:rPr lang="en-US" dirty="0">
+                <a:solidFill>
+                  <a:schemeClr val="bg1"/>
+                </a:solidFill>
+              </a:rPr>
+              <a:t>)</a:t>
+            </a:r>
+            <a:endParaRPr lang="en-CA" dirty="0">
+              <a:solidFill>
+                <a:schemeClr val="bg1"/>
+              </a:solidFill>
+            </a:endParaRPr>
+          </a:p>
+        </p:txBody>
+      </p:sp>
+      <p:cxnSp>
+        <p:nvCxnSpPr>
+          <p:cNvPr id="17" name="Straight Arrow Connector 16">
+            <a:extLst>
+              <a:ext uri="{FF2B5EF4-FFF2-40B4-BE49-F238E27FC236}">
+                <a16:creationId xmlns:a16="http://schemas.microsoft.com/office/drawing/2014/main" id="{87928AE6-190F-1911-AE82-EC396366B1CC}"/>
+              </a:ext>
+            </a:extLst>
+          </p:cNvPr>
+          <p:cNvCxnSpPr>
+            <a:cxnSpLocks/>
+            <a:stCxn id="10" idx="1"/>
+            <a:endCxn id="5" idx="2"/>
+          </p:cNvCxnSpPr>
+          <p:nvPr/>
+        </p:nvCxnSpPr>
+        <p:spPr>
+          <a:xfrm flipH="1" flipV="1">
+            <a:off x="2247900" y="3105150"/>
+            <a:ext cx="1009650" cy="1219200"/>
+          </a:xfrm>
+          <a:prstGeom prst="straightConnector1">
+            <a:avLst/>
+          </a:prstGeom>
+          <a:ln w="76200">
+            <a:tailEnd type="triangle"/>
+          </a:ln>
+        </p:spPr>
+        <p:style>
+          <a:lnRef idx="1">
+            <a:schemeClr val="accent1"/>
+          </a:lnRef>
+          <a:fillRef idx="0">
+            <a:schemeClr val="accent1"/>
+          </a:fillRef>
+          <a:effectRef idx="0">
+            <a:schemeClr val="accent1"/>
+          </a:effectRef>
+          <a:fontRef idx="minor">
+            <a:schemeClr val="tx1"/>
+          </a:fontRef>
+        </p:style>
+      </p:cxnSp>
+      <p:cxnSp>
+        <p:nvCxnSpPr>
+          <p:cNvPr id="21" name="Straight Arrow Connector 20">
+            <a:extLst>
+              <a:ext uri="{FF2B5EF4-FFF2-40B4-BE49-F238E27FC236}">
+                <a16:creationId xmlns:a16="http://schemas.microsoft.com/office/drawing/2014/main" id="{4D272E75-0CFA-F71E-EDFC-B3A1A2FDAAB9}"/>
+              </a:ext>
+            </a:extLst>
+          </p:cNvPr>
+          <p:cNvCxnSpPr>
+            <a:cxnSpLocks/>
+            <a:stCxn id="10" idx="3"/>
+            <a:endCxn id="7" idx="2"/>
+          </p:cNvCxnSpPr>
+          <p:nvPr/>
+        </p:nvCxnSpPr>
+        <p:spPr>
+          <a:xfrm flipV="1">
+            <a:off x="5886450" y="3105150"/>
+            <a:ext cx="1162050" cy="1219200"/>
+          </a:xfrm>
+          <a:prstGeom prst="straightConnector1">
+            <a:avLst/>
+          </a:prstGeom>
+          <a:ln w="76200">
+            <a:tailEnd type="triangle"/>
+          </a:ln>
+        </p:spPr>
+        <p:style>
+          <a:lnRef idx="1">
+            <a:schemeClr val="accent1"/>
+          </a:lnRef>
+          <a:fillRef idx="0">
+            <a:schemeClr val="accent1"/>
+          </a:fillRef>
+          <a:effectRef idx="0">
+            <a:schemeClr val="accent1"/>
+          </a:effectRef>
+          <a:fontRef idx="minor">
+            <a:schemeClr val="tx1"/>
+          </a:fontRef>
+        </p:style>
+      </p:cxnSp>
+    </p:spTree>
+    <p:extLst>
+      <p:ext uri="{BB962C8B-B14F-4D97-AF65-F5344CB8AC3E}">
+        <p14:creationId xmlns:p14="http://schemas.microsoft.com/office/powerpoint/2010/main" val="2102266669"/>
+      </p:ext>
+    </p:extLst>
+  </p:cSld>
+  <p:clrMapOvr>
+    <a:masterClrMapping/>
+  </p:clrMapOvr>
+  <p:transition/>
+</p:sld>
+</file>
+
+<file path=ppt/slides/slide13.xml><?xml version="1.0" encoding="utf-8"?>
+<p:sld xmlns:a="http://schemas.openxmlformats.org/drawingml/2006/main" xmlns:r="http://schemas.openxmlformats.org/officeDocument/2006/relationships" xmlns:p="http://schemas.openxmlformats.org/presentationml/2006/main" show="0">
+  <p:cSld>
+    <p:spTree>
+      <p:nvGrpSpPr>
+        <p:cNvPr id="1" name=""/>
+        <p:cNvGrpSpPr/>
+        <p:nvPr/>
+      </p:nvGrpSpPr>
+      <p:grpSpPr>
+        <a:xfrm>
+          <a:off x="0" y="0"/>
+          <a:ext cx="0" cy="0"/>
+          <a:chOff x="0" y="0"/>
+          <a:chExt cx="0" cy="0"/>
+        </a:xfrm>
+      </p:grpSpPr>
+      <p:sp>
+        <p:nvSpPr>
+          <p:cNvPr id="4" name="Rectangle: Rounded Corners 3">
+            <a:extLst>
+              <a:ext uri="{FF2B5EF4-FFF2-40B4-BE49-F238E27FC236}">
+                <a16:creationId xmlns:a16="http://schemas.microsoft.com/office/drawing/2014/main" id="{89221DBB-76DB-4E50-86EB-54D316A8F940}"/>
+              </a:ext>
+            </a:extLst>
+          </p:cNvPr>
+          <p:cNvSpPr/>
+          <p:nvPr/>
+        </p:nvSpPr>
+        <p:spPr>
+          <a:xfrm>
+            <a:off x="6210300" y="285750"/>
+            <a:ext cx="1676400" cy="1066800"/>
+          </a:xfrm>
+          <a:prstGeom prst="roundRect">
+            <a:avLst/>
+          </a:prstGeom>
+        </p:spPr>
+        <p:style>
+          <a:lnRef idx="1">
+            <a:schemeClr val="accent6"/>
+          </a:lnRef>
+          <a:fillRef idx="3">
+            <a:schemeClr val="accent6"/>
+          </a:fillRef>
+          <a:effectRef idx="2">
+            <a:schemeClr val="accent6"/>
+          </a:effectRef>
+          <a:fontRef idx="minor">
+            <a:schemeClr val="lt1"/>
+          </a:fontRef>
+        </p:style>
+        <p:txBody>
+          <a:bodyPr rtlCol="0" anchor="ctr"/>
+          <a:lstStyle/>
+          <a:p>
+            <a:pPr algn="ctr"/>
+            <a:r>
+              <a:rPr lang="en-US" dirty="0">
+                <a:solidFill>
+                  <a:schemeClr val="bg1"/>
+                </a:solidFill>
+              </a:rPr>
+              <a:t>Monster</a:t>
+            </a:r>
+          </a:p>
+          <a:p>
+            <a:pPr algn="ctr"/>
+            <a:r>
+              <a:rPr lang="en-US" dirty="0" err="1">
+                <a:solidFill>
+                  <a:schemeClr val="bg1"/>
+                </a:solidFill>
+              </a:rPr>
+              <a:t>locationXYZ</a:t>
+            </a:r>
+            <a:endParaRPr lang="en-CA" dirty="0">
+              <a:solidFill>
+                <a:schemeClr val="bg1"/>
+              </a:solidFill>
+            </a:endParaRPr>
+          </a:p>
+        </p:txBody>
+      </p:sp>
+      <p:sp>
+        <p:nvSpPr>
+          <p:cNvPr id="5" name="Rectangle: Rounded Corners 4">
+            <a:extLst>
+              <a:ext uri="{FF2B5EF4-FFF2-40B4-BE49-F238E27FC236}">
+                <a16:creationId xmlns:a16="http://schemas.microsoft.com/office/drawing/2014/main" id="{8089A44A-CE32-4FA9-9927-6F765FF48FF6}"/>
+              </a:ext>
+            </a:extLst>
+          </p:cNvPr>
+          <p:cNvSpPr/>
+          <p:nvPr/>
+        </p:nvSpPr>
+        <p:spPr>
+          <a:xfrm>
+            <a:off x="1295400" y="2038350"/>
+            <a:ext cx="1905000" cy="1066800"/>
+          </a:xfrm>
+          <a:prstGeom prst="roundRect">
+            <a:avLst/>
+          </a:prstGeom>
+        </p:spPr>
+        <p:style>
+          <a:lnRef idx="2">
+            <a:schemeClr val="accent1">
+              <a:shade val="50000"/>
+            </a:schemeClr>
+          </a:lnRef>
+          <a:fillRef idx="1">
+            <a:schemeClr val="accent1"/>
+          </a:fillRef>
+          <a:effectRef idx="0">
+            <a:schemeClr val="accent1"/>
+          </a:effectRef>
+          <a:fontRef idx="minor">
+            <a:schemeClr val="lt1"/>
+          </a:fontRef>
+        </p:style>
+        <p:txBody>
+          <a:bodyPr rtlCol="0" anchor="ctr"/>
+          <a:lstStyle/>
+          <a:p>
+            <a:pPr algn="ctr"/>
+            <a:r>
+              <a:rPr lang="en-US" dirty="0" err="1">
+                <a:solidFill>
+                  <a:schemeClr val="bg1"/>
+                </a:solidFill>
+              </a:rPr>
+              <a:t>cSuperMonster</a:t>
+            </a:r>
+            <a:endParaRPr lang="en-US" dirty="0">
+              <a:solidFill>
+                <a:schemeClr val="bg1"/>
+              </a:solidFill>
+            </a:endParaRPr>
+          </a:p>
+          <a:p>
+            <a:pPr algn="ctr"/>
+            <a:r>
+              <a:rPr lang="en-US" dirty="0">
+                <a:solidFill>
+                  <a:schemeClr val="bg1"/>
+                </a:solidFill>
+              </a:rPr>
+              <a:t>(</a:t>
+            </a:r>
+            <a:r>
+              <a:rPr lang="en-US" dirty="0" err="1">
+                <a:solidFill>
+                  <a:schemeClr val="bg1"/>
+                </a:solidFill>
+              </a:rPr>
+              <a:t>GiveBirth</a:t>
+            </a:r>
+            <a:r>
+              <a:rPr lang="en-US" dirty="0">
+                <a:solidFill>
+                  <a:schemeClr val="bg1"/>
+                </a:solidFill>
+              </a:rPr>
+              <a:t>)</a:t>
+            </a:r>
+            <a:endParaRPr lang="en-CA" dirty="0">
+              <a:solidFill>
+                <a:schemeClr val="bg1"/>
+              </a:solidFill>
+            </a:endParaRPr>
+          </a:p>
+        </p:txBody>
+      </p:sp>
+      <p:sp>
+        <p:nvSpPr>
+          <p:cNvPr id="7" name="Rectangle: Rounded Corners 6">
+            <a:extLst>
+              <a:ext uri="{FF2B5EF4-FFF2-40B4-BE49-F238E27FC236}">
+                <a16:creationId xmlns:a16="http://schemas.microsoft.com/office/drawing/2014/main" id="{3A30A23A-55B1-27AA-5E4C-3AA4BBE41927}"/>
+              </a:ext>
+            </a:extLst>
+          </p:cNvPr>
+          <p:cNvSpPr/>
+          <p:nvPr/>
+        </p:nvSpPr>
+        <p:spPr>
+          <a:xfrm>
+            <a:off x="6096000" y="2038350"/>
+            <a:ext cx="1905000" cy="1066800"/>
+          </a:xfrm>
+          <a:prstGeom prst="roundRect">
+            <a:avLst/>
+          </a:prstGeom>
+        </p:spPr>
+        <p:style>
+          <a:lnRef idx="3">
+            <a:schemeClr val="lt1"/>
+          </a:lnRef>
+          <a:fillRef idx="1">
+            <a:schemeClr val="accent2"/>
+          </a:fillRef>
+          <a:effectRef idx="1">
+            <a:schemeClr val="accent2"/>
+          </a:effectRef>
+          <a:fontRef idx="minor">
+            <a:schemeClr val="lt1"/>
+          </a:fontRef>
+        </p:style>
+        <p:txBody>
+          <a:bodyPr rtlCol="0" anchor="ctr"/>
+          <a:lstStyle/>
+          <a:p>
+            <a:pPr algn="ctr"/>
+            <a:r>
+              <a:rPr lang="en-US" dirty="0" err="1">
+                <a:solidFill>
+                  <a:schemeClr val="bg1"/>
+                </a:solidFill>
+              </a:rPr>
+              <a:t>cFlyingMonster</a:t>
+            </a:r>
+            <a:endParaRPr lang="en-US" dirty="0">
+              <a:solidFill>
+                <a:schemeClr val="bg1"/>
+              </a:solidFill>
+            </a:endParaRPr>
+          </a:p>
+          <a:p>
+            <a:pPr algn="ctr"/>
+            <a:r>
+              <a:rPr lang="en-US" dirty="0">
+                <a:solidFill>
+                  <a:schemeClr val="bg1"/>
+                </a:solidFill>
+              </a:rPr>
+              <a:t>(Fly)</a:t>
+            </a:r>
+            <a:endParaRPr lang="en-CA" dirty="0">
+              <a:solidFill>
+                <a:schemeClr val="bg1"/>
+              </a:solidFill>
+            </a:endParaRPr>
+          </a:p>
+        </p:txBody>
+      </p:sp>
+      <p:cxnSp>
+        <p:nvCxnSpPr>
+          <p:cNvPr id="8" name="Straight Arrow Connector 7">
+            <a:extLst>
+              <a:ext uri="{FF2B5EF4-FFF2-40B4-BE49-F238E27FC236}">
+                <a16:creationId xmlns:a16="http://schemas.microsoft.com/office/drawing/2014/main" id="{D9430D04-A31E-D4AE-EC54-18744E112E7F}"/>
+              </a:ext>
+            </a:extLst>
+          </p:cNvPr>
+          <p:cNvCxnSpPr>
+            <a:cxnSpLocks/>
+            <a:stCxn id="7" idx="0"/>
+            <a:endCxn id="4" idx="2"/>
+          </p:cNvCxnSpPr>
+          <p:nvPr/>
+        </p:nvCxnSpPr>
+        <p:spPr>
+          <a:xfrm flipV="1">
+            <a:off x="7048500" y="1352550"/>
+            <a:ext cx="0" cy="685800"/>
+          </a:xfrm>
+          <a:prstGeom prst="straightConnector1">
+            <a:avLst/>
+          </a:prstGeom>
+          <a:ln w="76200">
+            <a:tailEnd type="triangle"/>
+          </a:ln>
+        </p:spPr>
+        <p:style>
+          <a:lnRef idx="1">
+            <a:schemeClr val="accent1"/>
+          </a:lnRef>
+          <a:fillRef idx="0">
+            <a:schemeClr val="accent1"/>
+          </a:fillRef>
+          <a:effectRef idx="0">
+            <a:schemeClr val="accent1"/>
+          </a:effectRef>
+          <a:fontRef idx="minor">
+            <a:schemeClr val="tx1"/>
+          </a:fontRef>
+        </p:style>
+      </p:cxnSp>
+      <p:sp>
+        <p:nvSpPr>
+          <p:cNvPr id="10" name="Rectangle: Rounded Corners 9">
+            <a:extLst>
+              <a:ext uri="{FF2B5EF4-FFF2-40B4-BE49-F238E27FC236}">
+                <a16:creationId xmlns:a16="http://schemas.microsoft.com/office/drawing/2014/main" id="{B6AF5040-D097-91B7-976D-BB4862FAA70D}"/>
+              </a:ext>
+            </a:extLst>
+          </p:cNvPr>
+          <p:cNvSpPr/>
+          <p:nvPr/>
+        </p:nvSpPr>
+        <p:spPr>
+          <a:xfrm>
+            <a:off x="3257550" y="3790950"/>
+            <a:ext cx="2628900" cy="1066800"/>
+          </a:xfrm>
+          <a:prstGeom prst="roundRect">
+            <a:avLst/>
+          </a:prstGeom>
+        </p:spPr>
+        <p:style>
+          <a:lnRef idx="2">
+            <a:schemeClr val="accent5">
+              <a:shade val="15000"/>
+            </a:schemeClr>
+          </a:lnRef>
+          <a:fillRef idx="1">
+            <a:schemeClr val="accent5"/>
+          </a:fillRef>
+          <a:effectRef idx="0">
+            <a:schemeClr val="accent5"/>
+          </a:effectRef>
+          <a:fontRef idx="minor">
+            <a:schemeClr val="lt1"/>
+          </a:fontRef>
+        </p:style>
+        <p:txBody>
+          <a:bodyPr rtlCol="0" anchor="ctr"/>
+          <a:lstStyle/>
+          <a:p>
+            <a:pPr algn="ctr"/>
+            <a:r>
+              <a:rPr lang="en-US" dirty="0" err="1">
+                <a:solidFill>
+                  <a:schemeClr val="bg1"/>
+                </a:solidFill>
+              </a:rPr>
+              <a:t>cSuperFlyingMonster</a:t>
+            </a:r>
+            <a:endParaRPr lang="en-US" dirty="0">
+              <a:solidFill>
+                <a:schemeClr val="bg1"/>
+              </a:solidFill>
+            </a:endParaRPr>
+          </a:p>
+          <a:p>
+            <a:pPr algn="ctr"/>
+            <a:r>
+              <a:rPr lang="en-US" dirty="0">
+                <a:solidFill>
+                  <a:schemeClr val="bg1"/>
+                </a:solidFill>
+              </a:rPr>
+              <a:t>(</a:t>
+            </a:r>
+            <a:r>
+              <a:rPr lang="en-US" dirty="0" err="1">
+                <a:solidFill>
+                  <a:schemeClr val="bg1"/>
+                </a:solidFill>
+              </a:rPr>
+              <a:t>GiveBirth</a:t>
+            </a:r>
+            <a:r>
+              <a:rPr lang="en-US" dirty="0">
+                <a:solidFill>
+                  <a:schemeClr val="bg1"/>
+                </a:solidFill>
+              </a:rPr>
+              <a:t>)</a:t>
+            </a:r>
+            <a:endParaRPr lang="en-CA" dirty="0">
+              <a:solidFill>
+                <a:schemeClr val="bg1"/>
+              </a:solidFill>
+            </a:endParaRPr>
+          </a:p>
+        </p:txBody>
+      </p:sp>
+      <p:cxnSp>
+        <p:nvCxnSpPr>
+          <p:cNvPr id="17" name="Straight Arrow Connector 16">
+            <a:extLst>
+              <a:ext uri="{FF2B5EF4-FFF2-40B4-BE49-F238E27FC236}">
+                <a16:creationId xmlns:a16="http://schemas.microsoft.com/office/drawing/2014/main" id="{87928AE6-190F-1911-AE82-EC396366B1CC}"/>
+              </a:ext>
+            </a:extLst>
+          </p:cNvPr>
+          <p:cNvCxnSpPr>
+            <a:cxnSpLocks/>
+            <a:stCxn id="10" idx="1"/>
+            <a:endCxn id="5" idx="2"/>
+          </p:cNvCxnSpPr>
+          <p:nvPr/>
+        </p:nvCxnSpPr>
+        <p:spPr>
+          <a:xfrm flipH="1" flipV="1">
+            <a:off x="2247900" y="3105150"/>
+            <a:ext cx="1009650" cy="1219200"/>
+          </a:xfrm>
+          <a:prstGeom prst="straightConnector1">
+            <a:avLst/>
+          </a:prstGeom>
+          <a:ln w="76200">
+            <a:tailEnd type="triangle"/>
+          </a:ln>
+        </p:spPr>
+        <p:style>
+          <a:lnRef idx="1">
+            <a:schemeClr val="accent1"/>
+          </a:lnRef>
+          <a:fillRef idx="0">
+            <a:schemeClr val="accent1"/>
+          </a:fillRef>
+          <a:effectRef idx="0">
+            <a:schemeClr val="accent1"/>
+          </a:effectRef>
+          <a:fontRef idx="minor">
+            <a:schemeClr val="tx1"/>
+          </a:fontRef>
+        </p:style>
+      </p:cxnSp>
+      <p:cxnSp>
+        <p:nvCxnSpPr>
+          <p:cNvPr id="21" name="Straight Arrow Connector 20">
+            <a:extLst>
+              <a:ext uri="{FF2B5EF4-FFF2-40B4-BE49-F238E27FC236}">
+                <a16:creationId xmlns:a16="http://schemas.microsoft.com/office/drawing/2014/main" id="{4D272E75-0CFA-F71E-EDFC-B3A1A2FDAAB9}"/>
+              </a:ext>
+            </a:extLst>
+          </p:cNvPr>
+          <p:cNvCxnSpPr>
+            <a:cxnSpLocks/>
+            <a:stCxn id="10" idx="3"/>
+            <a:endCxn id="7" idx="2"/>
+          </p:cNvCxnSpPr>
+          <p:nvPr/>
+        </p:nvCxnSpPr>
+        <p:spPr>
+          <a:xfrm flipV="1">
+            <a:off x="5886450" y="3105150"/>
+            <a:ext cx="1162050" cy="1219200"/>
+          </a:xfrm>
+          <a:prstGeom prst="straightConnector1">
+            <a:avLst/>
+          </a:prstGeom>
+          <a:ln w="76200">
+            <a:tailEnd type="triangle"/>
+          </a:ln>
+        </p:spPr>
+        <p:style>
+          <a:lnRef idx="1">
+            <a:schemeClr val="accent1"/>
+          </a:lnRef>
+          <a:fillRef idx="0">
+            <a:schemeClr val="accent1"/>
+          </a:fillRef>
+          <a:effectRef idx="0">
+            <a:schemeClr val="accent1"/>
+          </a:effectRef>
+          <a:fontRef idx="minor">
+            <a:schemeClr val="tx1"/>
+          </a:fontRef>
+        </p:style>
+      </p:cxnSp>
+      <p:sp>
+        <p:nvSpPr>
+          <p:cNvPr id="3" name="Rectangle: Rounded Corners 2">
+            <a:extLst>
+              <a:ext uri="{FF2B5EF4-FFF2-40B4-BE49-F238E27FC236}">
+                <a16:creationId xmlns:a16="http://schemas.microsoft.com/office/drawing/2014/main" id="{E2451F40-943C-0CDC-C1A9-091609FEB98A}"/>
+              </a:ext>
+            </a:extLst>
+          </p:cNvPr>
+          <p:cNvSpPr/>
+          <p:nvPr/>
+        </p:nvSpPr>
+        <p:spPr>
+          <a:xfrm>
+            <a:off x="1464733" y="209550"/>
+            <a:ext cx="1676400" cy="1066800"/>
+          </a:xfrm>
+          <a:prstGeom prst="roundRect">
+            <a:avLst/>
+          </a:prstGeom>
+        </p:spPr>
+        <p:style>
+          <a:lnRef idx="1">
+            <a:schemeClr val="accent6"/>
+          </a:lnRef>
+          <a:fillRef idx="3">
+            <a:schemeClr val="accent6"/>
+          </a:fillRef>
+          <a:effectRef idx="2">
+            <a:schemeClr val="accent6"/>
+          </a:effectRef>
+          <a:fontRef idx="minor">
+            <a:schemeClr val="lt1"/>
+          </a:fontRef>
+        </p:style>
+        <p:txBody>
+          <a:bodyPr rtlCol="0" anchor="ctr"/>
+          <a:lstStyle/>
+          <a:p>
+            <a:pPr algn="ctr"/>
+            <a:r>
+              <a:rPr lang="en-US" dirty="0">
+                <a:solidFill>
+                  <a:schemeClr val="bg1"/>
+                </a:solidFill>
+              </a:rPr>
+              <a:t>Monster</a:t>
+            </a:r>
+          </a:p>
+          <a:p>
+            <a:pPr algn="ctr"/>
+            <a:r>
+              <a:rPr lang="en-US" dirty="0" err="1">
+                <a:solidFill>
+                  <a:schemeClr val="bg1"/>
+                </a:solidFill>
+              </a:rPr>
+              <a:t>locationXYZ</a:t>
+            </a:r>
+            <a:endParaRPr lang="en-CA" dirty="0">
+              <a:solidFill>
+                <a:schemeClr val="bg1"/>
+              </a:solidFill>
+            </a:endParaRPr>
+          </a:p>
+        </p:txBody>
+      </p:sp>
+      <p:cxnSp>
+        <p:nvCxnSpPr>
+          <p:cNvPr id="6" name="Straight Arrow Connector 5">
+            <a:extLst>
+              <a:ext uri="{FF2B5EF4-FFF2-40B4-BE49-F238E27FC236}">
+                <a16:creationId xmlns:a16="http://schemas.microsoft.com/office/drawing/2014/main" id="{2504B0CD-AB41-2710-9845-4DCAC030177C}"/>
+              </a:ext>
+            </a:extLst>
+          </p:cNvPr>
+          <p:cNvCxnSpPr>
+            <a:cxnSpLocks/>
+            <a:stCxn id="5" idx="0"/>
+            <a:endCxn id="3" idx="2"/>
+          </p:cNvCxnSpPr>
+          <p:nvPr/>
+        </p:nvCxnSpPr>
+        <p:spPr>
+          <a:xfrm flipV="1">
+            <a:off x="2247900" y="1276350"/>
+            <a:ext cx="55033" cy="762000"/>
+          </a:xfrm>
+          <a:prstGeom prst="straightConnector1">
+            <a:avLst/>
+          </a:prstGeom>
+          <a:ln w="76200">
+            <a:tailEnd type="triangle"/>
+          </a:ln>
+        </p:spPr>
+        <p:style>
+          <a:lnRef idx="1">
+            <a:schemeClr val="accent1"/>
+          </a:lnRef>
+          <a:fillRef idx="0">
+            <a:schemeClr val="accent1"/>
+          </a:fillRef>
+          <a:effectRef idx="0">
+            <a:schemeClr val="accent1"/>
+          </a:effectRef>
+          <a:fontRef idx="minor">
+            <a:schemeClr val="tx1"/>
+          </a:fontRef>
+        </p:style>
+      </p:cxnSp>
+    </p:spTree>
+    <p:extLst>
+      <p:ext uri="{BB962C8B-B14F-4D97-AF65-F5344CB8AC3E}">
+        <p14:creationId xmlns:p14="http://schemas.microsoft.com/office/powerpoint/2010/main" val="403989804"/>
+      </p:ext>
+    </p:extLst>
+  </p:cSld>
+  <p:clrMapOvr>
+    <a:masterClrMapping/>
+  </p:clrMapOvr>
+  <p:transition/>
+</p:sld>
+</file>
+
+<file path=ppt/slides/slide14.xml><?xml version="1.0" encoding="utf-8"?>
+<p:sld xmlns:a="http://schemas.openxmlformats.org/drawingml/2006/main" xmlns:r="http://schemas.openxmlformats.org/officeDocument/2006/relationships" xmlns:p="http://schemas.openxmlformats.org/presentationml/2006/main" show="0">
+  <p:cSld>
+    <p:spTree>
+      <p:nvGrpSpPr>
+        <p:cNvPr id="1" name=""/>
+        <p:cNvGrpSpPr/>
+        <p:nvPr/>
+      </p:nvGrpSpPr>
+      <p:grpSpPr>
+        <a:xfrm>
+          <a:off x="0" y="0"/>
+          <a:ext cx="0" cy="0"/>
+          <a:chOff x="0" y="0"/>
+          <a:chExt cx="0" cy="0"/>
+        </a:xfrm>
+      </p:grpSpPr>
+      <p:sp>
+        <p:nvSpPr>
+          <p:cNvPr id="5" name="Rectangle: Rounded Corners 4">
+            <a:extLst>
+              <a:ext uri="{FF2B5EF4-FFF2-40B4-BE49-F238E27FC236}">
+                <a16:creationId xmlns:a16="http://schemas.microsoft.com/office/drawing/2014/main" id="{8089A44A-CE32-4FA9-9927-6F765FF48FF6}"/>
+              </a:ext>
+            </a:extLst>
+          </p:cNvPr>
+          <p:cNvSpPr/>
+          <p:nvPr/>
+        </p:nvSpPr>
+        <p:spPr>
+          <a:xfrm>
+            <a:off x="2590800" y="1809750"/>
+            <a:ext cx="1905000" cy="1066800"/>
+          </a:xfrm>
+          <a:prstGeom prst="roundRect">
+            <a:avLst/>
+          </a:prstGeom>
+        </p:spPr>
+        <p:style>
+          <a:lnRef idx="2">
+            <a:schemeClr val="accent1">
+              <a:shade val="50000"/>
+            </a:schemeClr>
+          </a:lnRef>
+          <a:fillRef idx="1">
+            <a:schemeClr val="accent1"/>
+          </a:fillRef>
+          <a:effectRef idx="0">
+            <a:schemeClr val="accent1"/>
+          </a:effectRef>
+          <a:fontRef idx="minor">
+            <a:schemeClr val="lt1"/>
+          </a:fontRef>
+        </p:style>
+        <p:txBody>
+          <a:bodyPr rtlCol="0" anchor="ctr"/>
+          <a:lstStyle/>
+          <a:p>
+            <a:pPr algn="ctr"/>
+            <a:r>
+              <a:rPr lang="en-US" dirty="0" err="1">
+                <a:solidFill>
+                  <a:schemeClr val="bg1"/>
+                </a:solidFill>
+              </a:rPr>
+              <a:t>cSuperMonster</a:t>
+            </a:r>
+            <a:endParaRPr lang="en-US" dirty="0">
+              <a:solidFill>
+                <a:schemeClr val="bg1"/>
+              </a:solidFill>
+            </a:endParaRPr>
+          </a:p>
+          <a:p>
+            <a:pPr algn="ctr"/>
+            <a:r>
+              <a:rPr lang="en-US" dirty="0">
+                <a:solidFill>
+                  <a:schemeClr val="bg1"/>
+                </a:solidFill>
+              </a:rPr>
+              <a:t>(</a:t>
+            </a:r>
+            <a:r>
+              <a:rPr lang="en-US" dirty="0" err="1">
+                <a:solidFill>
+                  <a:schemeClr val="bg1"/>
+                </a:solidFill>
+              </a:rPr>
+              <a:t>GiveBirth</a:t>
+            </a:r>
+            <a:r>
+              <a:rPr lang="en-US" dirty="0">
+                <a:solidFill>
+                  <a:schemeClr val="bg1"/>
+                </a:solidFill>
+              </a:rPr>
+              <a:t>)</a:t>
+            </a:r>
+            <a:endParaRPr lang="en-CA" dirty="0">
+              <a:solidFill>
+                <a:schemeClr val="bg1"/>
+              </a:solidFill>
+            </a:endParaRPr>
+          </a:p>
+        </p:txBody>
+      </p:sp>
+      <p:sp>
+        <p:nvSpPr>
+          <p:cNvPr id="7" name="Rectangle: Rounded Corners 6">
+            <a:extLst>
+              <a:ext uri="{FF2B5EF4-FFF2-40B4-BE49-F238E27FC236}">
+                <a16:creationId xmlns:a16="http://schemas.microsoft.com/office/drawing/2014/main" id="{3A30A23A-55B1-27AA-5E4C-3AA4BBE41927}"/>
+              </a:ext>
+            </a:extLst>
+          </p:cNvPr>
+          <p:cNvSpPr/>
+          <p:nvPr/>
+        </p:nvSpPr>
+        <p:spPr>
+          <a:xfrm>
+            <a:off x="2590800" y="3409950"/>
+            <a:ext cx="1905000" cy="1066800"/>
+          </a:xfrm>
+          <a:prstGeom prst="roundRect">
+            <a:avLst/>
+          </a:prstGeom>
+        </p:spPr>
+        <p:style>
+          <a:lnRef idx="3">
+            <a:schemeClr val="lt1"/>
+          </a:lnRef>
+          <a:fillRef idx="1">
+            <a:schemeClr val="accent2"/>
+          </a:fillRef>
+          <a:effectRef idx="1">
+            <a:schemeClr val="accent2"/>
+          </a:effectRef>
+          <a:fontRef idx="minor">
+            <a:schemeClr val="lt1"/>
+          </a:fontRef>
+        </p:style>
+        <p:txBody>
+          <a:bodyPr rtlCol="0" anchor="ctr"/>
+          <a:lstStyle/>
+          <a:p>
+            <a:pPr algn="ctr"/>
+            <a:r>
+              <a:rPr lang="en-US" dirty="0" err="1">
+                <a:solidFill>
+                  <a:schemeClr val="bg1"/>
+                </a:solidFill>
+              </a:rPr>
+              <a:t>cFlyingMonster</a:t>
+            </a:r>
+            <a:endParaRPr lang="en-US" dirty="0">
+              <a:solidFill>
+                <a:schemeClr val="bg1"/>
+              </a:solidFill>
+            </a:endParaRPr>
+          </a:p>
+          <a:p>
+            <a:pPr algn="ctr"/>
+            <a:r>
+              <a:rPr lang="en-US" dirty="0">
+                <a:solidFill>
+                  <a:schemeClr val="bg1"/>
+                </a:solidFill>
+              </a:rPr>
+              <a:t>(Fly)</a:t>
+            </a:r>
+            <a:endParaRPr lang="en-CA" dirty="0">
+              <a:solidFill>
+                <a:schemeClr val="bg1"/>
+              </a:solidFill>
+            </a:endParaRPr>
+          </a:p>
+        </p:txBody>
+      </p:sp>
+      <p:cxnSp>
+        <p:nvCxnSpPr>
+          <p:cNvPr id="8" name="Straight Arrow Connector 7">
+            <a:extLst>
+              <a:ext uri="{FF2B5EF4-FFF2-40B4-BE49-F238E27FC236}">
+                <a16:creationId xmlns:a16="http://schemas.microsoft.com/office/drawing/2014/main" id="{D9430D04-A31E-D4AE-EC54-18744E112E7F}"/>
+              </a:ext>
+            </a:extLst>
+          </p:cNvPr>
+          <p:cNvCxnSpPr>
+            <a:cxnSpLocks/>
+            <a:stCxn id="7" idx="0"/>
+            <a:endCxn id="5" idx="2"/>
+          </p:cNvCxnSpPr>
+          <p:nvPr/>
+        </p:nvCxnSpPr>
+        <p:spPr>
+          <a:xfrm flipV="1">
+            <a:off x="3543300" y="2876550"/>
+            <a:ext cx="0" cy="533400"/>
+          </a:xfrm>
+          <a:prstGeom prst="straightConnector1">
+            <a:avLst/>
+          </a:prstGeom>
+          <a:ln w="76200">
+            <a:tailEnd type="triangle"/>
+          </a:ln>
+        </p:spPr>
+        <p:style>
+          <a:lnRef idx="1">
+            <a:schemeClr val="accent1"/>
+          </a:lnRef>
+          <a:fillRef idx="0">
+            <a:schemeClr val="accent1"/>
+          </a:fillRef>
+          <a:effectRef idx="0">
+            <a:schemeClr val="accent1"/>
+          </a:effectRef>
+          <a:fontRef idx="minor">
+            <a:schemeClr val="tx1"/>
+          </a:fontRef>
+        </p:style>
+      </p:cxnSp>
+      <p:sp>
+        <p:nvSpPr>
+          <p:cNvPr id="10" name="Rectangle: Rounded Corners 9">
+            <a:extLst>
+              <a:ext uri="{FF2B5EF4-FFF2-40B4-BE49-F238E27FC236}">
+                <a16:creationId xmlns:a16="http://schemas.microsoft.com/office/drawing/2014/main" id="{B6AF5040-D097-91B7-976D-BB4862FAA70D}"/>
+              </a:ext>
+            </a:extLst>
+          </p:cNvPr>
+          <p:cNvSpPr/>
+          <p:nvPr/>
+        </p:nvSpPr>
+        <p:spPr>
+          <a:xfrm>
+            <a:off x="5943600" y="3562350"/>
+            <a:ext cx="2628900" cy="1066800"/>
+          </a:xfrm>
+          <a:prstGeom prst="roundRect">
+            <a:avLst/>
+          </a:prstGeom>
+        </p:spPr>
+        <p:style>
+          <a:lnRef idx="2">
+            <a:schemeClr val="accent5">
+              <a:shade val="15000"/>
+            </a:schemeClr>
+          </a:lnRef>
+          <a:fillRef idx="1">
+            <a:schemeClr val="accent5"/>
+          </a:fillRef>
+          <a:effectRef idx="0">
+            <a:schemeClr val="accent5"/>
+          </a:effectRef>
+          <a:fontRef idx="minor">
+            <a:schemeClr val="lt1"/>
+          </a:fontRef>
+        </p:style>
+        <p:txBody>
+          <a:bodyPr rtlCol="0" anchor="ctr"/>
+          <a:lstStyle/>
+          <a:p>
+            <a:pPr algn="ctr"/>
+            <a:r>
+              <a:rPr lang="en-US" dirty="0" err="1">
+                <a:solidFill>
+                  <a:schemeClr val="bg1"/>
+                </a:solidFill>
+              </a:rPr>
+              <a:t>cSuperFlyingMonster</a:t>
+            </a:r>
+            <a:endParaRPr lang="en-US" dirty="0">
+              <a:solidFill>
+                <a:schemeClr val="bg1"/>
+              </a:solidFill>
+            </a:endParaRPr>
+          </a:p>
+          <a:p>
+            <a:pPr algn="ctr"/>
+            <a:r>
+              <a:rPr lang="en-US" dirty="0">
+                <a:solidFill>
+                  <a:schemeClr val="bg1"/>
+                </a:solidFill>
+              </a:rPr>
+              <a:t>(</a:t>
+            </a:r>
+            <a:r>
+              <a:rPr lang="en-US" dirty="0" err="1">
+                <a:solidFill>
+                  <a:schemeClr val="bg1"/>
+                </a:solidFill>
+              </a:rPr>
+              <a:t>GiveBirth</a:t>
+            </a:r>
+            <a:r>
+              <a:rPr lang="en-US" dirty="0">
+                <a:solidFill>
+                  <a:schemeClr val="bg1"/>
+                </a:solidFill>
+              </a:rPr>
+              <a:t>)</a:t>
+            </a:r>
+            <a:endParaRPr lang="en-CA" dirty="0">
+              <a:solidFill>
+                <a:schemeClr val="bg1"/>
+              </a:solidFill>
+            </a:endParaRPr>
+          </a:p>
+        </p:txBody>
+      </p:sp>
+      <p:cxnSp>
+        <p:nvCxnSpPr>
+          <p:cNvPr id="17" name="Straight Arrow Connector 16">
+            <a:extLst>
+              <a:ext uri="{FF2B5EF4-FFF2-40B4-BE49-F238E27FC236}">
+                <a16:creationId xmlns:a16="http://schemas.microsoft.com/office/drawing/2014/main" id="{87928AE6-190F-1911-AE82-EC396366B1CC}"/>
+              </a:ext>
+            </a:extLst>
+          </p:cNvPr>
+          <p:cNvCxnSpPr>
+            <a:cxnSpLocks/>
+            <a:stCxn id="10" idx="1"/>
+            <a:endCxn id="7" idx="3"/>
+          </p:cNvCxnSpPr>
+          <p:nvPr/>
+        </p:nvCxnSpPr>
+        <p:spPr>
+          <a:xfrm flipH="1" flipV="1">
+            <a:off x="4495800" y="3943350"/>
+            <a:ext cx="1447800" cy="152400"/>
+          </a:xfrm>
+          <a:prstGeom prst="straightConnector1">
+            <a:avLst/>
+          </a:prstGeom>
+          <a:ln w="76200">
+            <a:tailEnd type="triangle"/>
+          </a:ln>
+        </p:spPr>
+        <p:style>
+          <a:lnRef idx="1">
+            <a:schemeClr val="accent1"/>
+          </a:lnRef>
+          <a:fillRef idx="0">
+            <a:schemeClr val="accent1"/>
+          </a:fillRef>
+          <a:effectRef idx="0">
+            <a:schemeClr val="accent1"/>
+          </a:effectRef>
+          <a:fontRef idx="minor">
+            <a:schemeClr val="tx1"/>
+          </a:fontRef>
+        </p:style>
+      </p:cxnSp>
+      <p:sp>
+        <p:nvSpPr>
+          <p:cNvPr id="3" name="Rectangle: Rounded Corners 2">
+            <a:extLst>
+              <a:ext uri="{FF2B5EF4-FFF2-40B4-BE49-F238E27FC236}">
+                <a16:creationId xmlns:a16="http://schemas.microsoft.com/office/drawing/2014/main" id="{E2451F40-943C-0CDC-C1A9-091609FEB98A}"/>
+              </a:ext>
+            </a:extLst>
+          </p:cNvPr>
+          <p:cNvSpPr/>
+          <p:nvPr/>
+        </p:nvSpPr>
+        <p:spPr>
+          <a:xfrm>
+            <a:off x="3022600" y="180975"/>
+            <a:ext cx="1676400" cy="1066800"/>
+          </a:xfrm>
+          <a:prstGeom prst="roundRect">
+            <a:avLst/>
+          </a:prstGeom>
+        </p:spPr>
+        <p:style>
+          <a:lnRef idx="1">
+            <a:schemeClr val="accent6"/>
+          </a:lnRef>
+          <a:fillRef idx="3">
+            <a:schemeClr val="accent6"/>
+          </a:fillRef>
+          <a:effectRef idx="2">
+            <a:schemeClr val="accent6"/>
+          </a:effectRef>
+          <a:fontRef idx="minor">
+            <a:schemeClr val="lt1"/>
+          </a:fontRef>
+        </p:style>
+        <p:txBody>
+          <a:bodyPr rtlCol="0" anchor="ctr"/>
+          <a:lstStyle/>
+          <a:p>
+            <a:pPr algn="ctr"/>
+            <a:r>
+              <a:rPr lang="en-US" dirty="0">
+                <a:solidFill>
+                  <a:schemeClr val="bg1"/>
+                </a:solidFill>
+              </a:rPr>
+              <a:t>Monster</a:t>
+            </a:r>
+          </a:p>
+          <a:p>
+            <a:pPr algn="ctr"/>
+            <a:r>
+              <a:rPr lang="en-US" dirty="0" err="1">
+                <a:solidFill>
+                  <a:schemeClr val="bg1"/>
+                </a:solidFill>
+              </a:rPr>
+              <a:t>locationXYZ</a:t>
+            </a:r>
+            <a:endParaRPr lang="en-CA" dirty="0">
+              <a:solidFill>
+                <a:schemeClr val="bg1"/>
+              </a:solidFill>
+            </a:endParaRPr>
+          </a:p>
+        </p:txBody>
+      </p:sp>
+      <p:cxnSp>
+        <p:nvCxnSpPr>
+          <p:cNvPr id="6" name="Straight Arrow Connector 5">
+            <a:extLst>
+              <a:ext uri="{FF2B5EF4-FFF2-40B4-BE49-F238E27FC236}">
+                <a16:creationId xmlns:a16="http://schemas.microsoft.com/office/drawing/2014/main" id="{2504B0CD-AB41-2710-9845-4DCAC030177C}"/>
+              </a:ext>
+            </a:extLst>
+          </p:cNvPr>
+          <p:cNvCxnSpPr>
+            <a:cxnSpLocks/>
+            <a:stCxn id="5" idx="0"/>
+            <a:endCxn id="3" idx="2"/>
+          </p:cNvCxnSpPr>
+          <p:nvPr/>
+        </p:nvCxnSpPr>
+        <p:spPr>
+          <a:xfrm flipV="1">
+            <a:off x="3543300" y="1247775"/>
+            <a:ext cx="317500" cy="561975"/>
+          </a:xfrm>
+          <a:prstGeom prst="straightConnector1">
+            <a:avLst/>
+          </a:prstGeom>
+          <a:ln w="76200">
+            <a:tailEnd type="triangle"/>
+          </a:ln>
+        </p:spPr>
+        <p:style>
+          <a:lnRef idx="1">
+            <a:schemeClr val="accent1"/>
+          </a:lnRef>
+          <a:fillRef idx="0">
+            <a:schemeClr val="accent1"/>
+          </a:fillRef>
+          <a:effectRef idx="0">
+            <a:schemeClr val="accent1"/>
+          </a:effectRef>
+          <a:fontRef idx="minor">
+            <a:schemeClr val="tx1"/>
+          </a:fontRef>
+        </p:style>
+      </p:cxnSp>
+    </p:spTree>
+    <p:extLst>
+      <p:ext uri="{BB962C8B-B14F-4D97-AF65-F5344CB8AC3E}">
+        <p14:creationId xmlns:p14="http://schemas.microsoft.com/office/powerpoint/2010/main" val="4272168968"/>
+      </p:ext>
+    </p:extLst>
+  </p:cSld>
+  <p:clrMapOvr>
+    <a:masterClrMapping/>
+  </p:clrMapOvr>
+  <p:transition/>
+</p:sld>
+</file>
+
+<file path=ppt/slides/slide15.xml><?xml version="1.0" encoding="utf-8"?>
+<p:sld xmlns:a="http://schemas.openxmlformats.org/drawingml/2006/main" xmlns:r="http://schemas.openxmlformats.org/officeDocument/2006/relationships" xmlns:p="http://schemas.openxmlformats.org/presentationml/2006/main">
+  <p:cSld>
+    <p:spTree>
+      <p:nvGrpSpPr>
+        <p:cNvPr id="1" name=""/>
+        <p:cNvGrpSpPr/>
+        <p:nvPr/>
+      </p:nvGrpSpPr>
+      <p:grpSpPr>
+        <a:xfrm>
+          <a:off x="0" y="0"/>
+          <a:ext cx="0" cy="0"/>
+          <a:chOff x="0" y="0"/>
+          <a:chExt cx="0" cy="0"/>
+        </a:xfrm>
+      </p:grpSpPr>
+      <p:sp>
+        <p:nvSpPr>
+          <p:cNvPr id="2" name="Title 1"/>
+          <p:cNvSpPr>
+            <a:spLocks noGrp="1"/>
+          </p:cNvSpPr>
+          <p:nvPr>
+            <p:ph type="title"/>
+          </p:nvPr>
+        </p:nvSpPr>
+        <p:spPr>
+          <a:xfrm>
+            <a:off x="914400" y="384048"/>
+            <a:ext cx="7772400" cy="968502"/>
+          </a:xfrm>
+        </p:spPr>
+        <p:txBody>
+          <a:bodyPr/>
+          <a:lstStyle/>
+          <a:p>
+            <a:r>
+              <a:rPr lang="en-CA" dirty="0"/>
+              <a:t>Multiple inheritance : Evil?</a:t>
+            </a:r>
+          </a:p>
+        </p:txBody>
+      </p:sp>
+      <p:sp>
+        <p:nvSpPr>
+          <p:cNvPr id="3" name="Content Placeholder 2"/>
+          <p:cNvSpPr>
+            <a:spLocks noGrp="1"/>
+          </p:cNvSpPr>
+          <p:nvPr>
+            <p:ph idx="1"/>
+          </p:nvPr>
+        </p:nvSpPr>
+        <p:spPr>
+          <a:xfrm>
+            <a:off x="304800" y="1428750"/>
+            <a:ext cx="8839200" cy="3337920"/>
+          </a:xfrm>
+        </p:spPr>
+        <p:txBody>
+          <a:bodyPr>
+            <a:normAutofit fontScale="85000" lnSpcReduction="20000"/>
+          </a:bodyPr>
+          <a:lstStyle/>
+          <a:p>
+            <a:r>
+              <a:rPr lang="en-CA" dirty="0"/>
+              <a:t>No, but you have to be careful.</a:t>
+            </a:r>
+          </a:p>
+          <a:p>
+            <a:r>
+              <a:rPr lang="en-CA" dirty="0"/>
+              <a:t>If you can’t have multiple inheritance (like in Java) you risk two things:</a:t>
+            </a:r>
+          </a:p>
+          <a:p>
+            <a:pPr lvl="1"/>
+            <a:r>
+              <a:rPr lang="en-CA" dirty="0"/>
+              <a:t>Really deep inheritance chains</a:t>
+            </a:r>
+          </a:p>
+          <a:p>
+            <a:pPr lvl="1"/>
+            <a:r>
+              <a:rPr lang="en-CA" dirty="0"/>
+              <a:t>Hacks where you’ve been required to inherit something that you really shouldn’t have to (see previous slide </a:t>
+            </a:r>
+            <a:r>
+              <a:rPr lang="en-CA" dirty="0" err="1"/>
+              <a:t>whewere</a:t>
+            </a:r>
+            <a:r>
+              <a:rPr lang="en-CA" dirty="0"/>
+              <a:t> </a:t>
+            </a:r>
+            <a:r>
+              <a:rPr lang="en-CA" dirty="0" err="1"/>
+              <a:t>FlyingMonster</a:t>
+            </a:r>
+            <a:r>
+              <a:rPr lang="en-CA" dirty="0"/>
+              <a:t> has “</a:t>
+            </a:r>
+            <a:r>
+              <a:rPr lang="en-CA" dirty="0" err="1"/>
+              <a:t>GiveBirth</a:t>
+            </a:r>
+            <a:r>
+              <a:rPr lang="en-CA" dirty="0"/>
+              <a:t>()” from Super Monster when it’s not supposed to have it.</a:t>
+            </a:r>
+          </a:p>
+          <a:p>
+            <a:pPr lvl="1"/>
+            <a:r>
+              <a:rPr lang="en-CA" dirty="0"/>
+              <a:t>And if you put Flying Monster </a:t>
+            </a:r>
+            <a:r>
+              <a:rPr lang="en-CA" i="1" dirty="0"/>
+              <a:t>before </a:t>
+            </a:r>
+            <a:r>
+              <a:rPr lang="en-CA" dirty="0"/>
+              <a:t>Super Monster, then the </a:t>
+            </a:r>
+            <a:r>
+              <a:rPr lang="en-CA" dirty="0" err="1"/>
+              <a:t>FlyingMonster</a:t>
+            </a:r>
+            <a:r>
+              <a:rPr lang="en-CA" dirty="0"/>
+              <a:t> can </a:t>
+            </a:r>
+            <a:r>
+              <a:rPr lang="en-CA" dirty="0" err="1"/>
+              <a:t>GiveBirth</a:t>
+            </a:r>
+            <a:r>
+              <a:rPr lang="en-CA" dirty="0"/>
+              <a:t>()</a:t>
+            </a:r>
+          </a:p>
+        </p:txBody>
+      </p:sp>
+      <p:sp>
+        <p:nvSpPr>
+          <p:cNvPr id="4" name="AutoShape 6"/>
+          <p:cNvSpPr>
+            <a:spLocks noChangeArrowheads="1"/>
+          </p:cNvSpPr>
+          <p:nvPr/>
+        </p:nvSpPr>
+        <p:spPr bwMode="auto">
+          <a:xfrm>
+            <a:off x="8534400" y="4800600"/>
+            <a:ext cx="609600" cy="342900"/>
+          </a:xfrm>
+          <a:prstGeom prst="rightArrow">
+            <a:avLst>
+              <a:gd name="adj1" fmla="val 50000"/>
+              <a:gd name="adj2" fmla="val 33333"/>
+            </a:avLst>
+          </a:prstGeom>
+          <a:noFill/>
+          <a:ln w="19050">
+            <a:solidFill>
+              <a:srgbClr val="969696"/>
+            </a:solidFill>
+            <a:miter lim="800000"/>
+            <a:headEnd/>
+            <a:tailEnd/>
+          </a:ln>
+        </p:spPr>
+        <p:txBody>
+          <a:bodyPr wrap="none" anchor="ctr"/>
+          <a:lstStyle/>
+          <a:p>
+            <a:endParaRPr lang="en-CA"/>
+          </a:p>
+        </p:txBody>
+      </p:sp>
+    </p:spTree>
+    <p:extLst>
+      <p:ext uri="{BB962C8B-B14F-4D97-AF65-F5344CB8AC3E}">
+        <p14:creationId xmlns:p14="http://schemas.microsoft.com/office/powerpoint/2010/main" val="4189321164"/>
+      </p:ext>
+    </p:extLst>
+  </p:cSld>
+  <p:clrMapOvr>
+    <a:masterClrMapping/>
+  </p:clrMapOvr>
+  <p:timing>
+    <p:tnLst>
+      <p:par>
+        <p:cTn id="1" dur="indefinite" restart="never" nodeType="tmRoot">
+          <p:childTnLst>
+            <p:seq concurrent="1" nextAc="seek">
+              <p:cTn id="2" dur="indefinite" nodeType="mainSeq">
+                <p:childTnLst>
+                  <p:par>
+                    <p:cTn id="3" fill="hold">
+                      <p:stCondLst>
+                        <p:cond delay="indefinite"/>
+                      </p:stCondLst>
+                      <p:childTnLst>
+                        <p:par>
+                          <p:cTn id="4" fill="hold">
+                            <p:stCondLst>
+                              <p:cond delay="0"/>
+                            </p:stCondLst>
+                            <p:childTnLst>
+                              <p:par>
+                                <p:cTn id="5" presetID="10" presetClass="entr" presetSubtype="0" fill="hold" grpId="0" nodeType="clickEffect">
+                                  <p:stCondLst>
+                                    <p:cond delay="0"/>
+                                  </p:stCondLst>
+                                  <p:childTnLst>
+                                    <p:set>
+                                      <p:cBhvr>
+                                        <p:cTn id="6" dur="1" fill="hold">
+                                          <p:stCondLst>
+                                            <p:cond delay="0"/>
+                                          </p:stCondLst>
+                                        </p:cTn>
+                                        <p:tgtEl>
+                                          <p:spTgt spid="4"/>
+                                        </p:tgtEl>
+                                        <p:attrNameLst>
+                                          <p:attrName>style.visibility</p:attrName>
+                                        </p:attrNameLst>
+                                      </p:cBhvr>
+                                      <p:to>
+                                        <p:strVal val="visible"/>
+                                      </p:to>
+                                    </p:set>
+                                    <p:animEffect transition="in" filter="fade">
+                                      <p:cBhvr>
+                                        <p:cTn id="7" dur="500"/>
+                                        <p:tgtEl>
+                                          <p:spTgt spid="4"/>
+                                        </p:tgtEl>
+                                      </p:cBhvr>
+                                    </p:animEffect>
+                                  </p:childTnLst>
+                                </p:cTn>
+                              </p:par>
+                            </p:childTnLst>
+                          </p:cTn>
+                        </p:par>
+                      </p:childTnLst>
+                    </p:cTn>
+                  </p:par>
+                </p:childTnLst>
+              </p:cTn>
+              <p:prevCondLst>
+                <p:cond evt="onPrev" delay="0">
+                  <p:tgtEl>
+                    <p:sldTgt/>
+                  </p:tgtEl>
+                </p:cond>
+              </p:prevCondLst>
+              <p:nextCondLst>
+                <p:cond evt="onNext" delay="0">
+                  <p:tgtEl>
+                    <p:sldTgt/>
+                  </p:tgtEl>
+                </p:cond>
+              </p:nextCondLst>
+            </p:seq>
+          </p:childTnLst>
+        </p:cTn>
+      </p:par>
+    </p:tnLst>
+    <p:bldLst>
+      <p:bldP spid="4" grpId="0" animBg="1"/>
+    </p:bldLst>
+  </p:timing>
+</p:sld>
+</file>
+
+<file path=ppt/slides/slide16.xml><?xml version="1.0" encoding="utf-8"?>
+<p:sld xmlns:a="http://schemas.openxmlformats.org/drawingml/2006/main" xmlns:r="http://schemas.openxmlformats.org/officeDocument/2006/relationships" xmlns:p="http://schemas.openxmlformats.org/presentationml/2006/main">
+  <p:cSld>
+    <p:spTree>
+      <p:nvGrpSpPr>
+        <p:cNvPr id="1" name=""/>
+        <p:cNvGrpSpPr/>
+        <p:nvPr/>
+      </p:nvGrpSpPr>
+      <p:grpSpPr>
+        <a:xfrm>
+          <a:off x="0" y="0"/>
+          <a:ext cx="0" cy="0"/>
+          <a:chOff x="0" y="0"/>
+          <a:chExt cx="0" cy="0"/>
+        </a:xfrm>
+      </p:grpSpPr>
+      <p:sp>
+        <p:nvSpPr>
+          <p:cNvPr id="2" name="Title 1"/>
+          <p:cNvSpPr>
+            <a:spLocks noGrp="1"/>
+          </p:cNvSpPr>
+          <p:nvPr>
+            <p:ph type="title"/>
+          </p:nvPr>
+        </p:nvSpPr>
+        <p:spPr>
+          <a:xfrm>
+            <a:off x="914400" y="384048"/>
+            <a:ext cx="7772400" cy="968502"/>
+          </a:xfrm>
+        </p:spPr>
+        <p:txBody>
+          <a:bodyPr/>
+          <a:lstStyle/>
+          <a:p>
+            <a:r>
+              <a:rPr lang="en-CA" dirty="0"/>
+              <a:t>Interfaces… What and why?</a:t>
+            </a:r>
+          </a:p>
+        </p:txBody>
+      </p:sp>
+      <p:sp>
+        <p:nvSpPr>
+          <p:cNvPr id="3" name="Content Placeholder 2"/>
+          <p:cNvSpPr>
+            <a:spLocks noGrp="1"/>
+          </p:cNvSpPr>
+          <p:nvPr>
+            <p:ph idx="1"/>
+          </p:nvPr>
+        </p:nvSpPr>
+        <p:spPr>
+          <a:xfrm>
+            <a:off x="304800" y="1428750"/>
+            <a:ext cx="8839200" cy="3337920"/>
+          </a:xfrm>
+        </p:spPr>
+        <p:txBody>
+          <a:bodyPr>
+            <a:normAutofit/>
+          </a:bodyPr>
+          <a:lstStyle/>
+          <a:p>
+            <a:r>
+              <a:rPr lang="en-CA" dirty="0"/>
+              <a:t>Interface classes</a:t>
+            </a:r>
+          </a:p>
+          <a:p>
+            <a:pPr lvl="1"/>
+            <a:r>
+              <a:rPr lang="en-CA" dirty="0"/>
+              <a:t>C++ these are called “pure virtual”</a:t>
+            </a:r>
+          </a:p>
+          <a:p>
+            <a:r>
+              <a:rPr lang="en-CA" dirty="0"/>
+              <a:t>Unlike Java/C#/whatever there aren’t actual “interface” things. They are a (strange) variation of the regular virtual C++ class</a:t>
+            </a:r>
+          </a:p>
+        </p:txBody>
+      </p:sp>
+      <p:sp>
+        <p:nvSpPr>
+          <p:cNvPr id="4" name="AutoShape 6"/>
+          <p:cNvSpPr>
+            <a:spLocks noChangeArrowheads="1"/>
+          </p:cNvSpPr>
+          <p:nvPr/>
+        </p:nvSpPr>
+        <p:spPr bwMode="auto">
+          <a:xfrm>
+            <a:off x="8534400" y="4800600"/>
+            <a:ext cx="609600" cy="342900"/>
+          </a:xfrm>
+          <a:prstGeom prst="rightArrow">
+            <a:avLst>
+              <a:gd name="adj1" fmla="val 50000"/>
+              <a:gd name="adj2" fmla="val 33333"/>
+            </a:avLst>
+          </a:prstGeom>
+          <a:noFill/>
+          <a:ln w="19050">
+            <a:solidFill>
+              <a:srgbClr val="969696"/>
+            </a:solidFill>
+            <a:miter lim="800000"/>
+            <a:headEnd/>
+            <a:tailEnd/>
+          </a:ln>
+        </p:spPr>
+        <p:txBody>
+          <a:bodyPr wrap="none" anchor="ctr"/>
+          <a:lstStyle/>
+          <a:p>
+            <a:endParaRPr lang="en-CA"/>
+          </a:p>
+        </p:txBody>
+      </p:sp>
+    </p:spTree>
+    <p:extLst>
+      <p:ext uri="{BB962C8B-B14F-4D97-AF65-F5344CB8AC3E}">
+        <p14:creationId xmlns:p14="http://schemas.microsoft.com/office/powerpoint/2010/main" val="1574252580"/>
+      </p:ext>
+    </p:extLst>
+  </p:cSld>
+  <p:clrMapOvr>
+    <a:masterClrMapping/>
+  </p:clrMapOvr>
+  <p:timing>
+    <p:tnLst>
+      <p:par>
+        <p:cTn id="1" dur="indefinite" restart="never" nodeType="tmRoot">
+          <p:childTnLst>
+            <p:seq concurrent="1" nextAc="seek">
+              <p:cTn id="2" dur="indefinite" nodeType="mainSeq">
+                <p:childTnLst>
+                  <p:par>
+                    <p:cTn id="3" fill="hold">
+                      <p:stCondLst>
+                        <p:cond delay="indefinite"/>
+                      </p:stCondLst>
+                      <p:childTnLst>
+                        <p:par>
+                          <p:cTn id="4" fill="hold">
+                            <p:stCondLst>
+                              <p:cond delay="0"/>
+                            </p:stCondLst>
+                            <p:childTnLst>
+                              <p:par>
+                                <p:cTn id="5" presetID="10" presetClass="entr" presetSubtype="0" fill="hold" grpId="0" nodeType="clickEffect">
+                                  <p:stCondLst>
+                                    <p:cond delay="0"/>
+                                  </p:stCondLst>
+                                  <p:childTnLst>
+                                    <p:set>
+                                      <p:cBhvr>
+                                        <p:cTn id="6" dur="1" fill="hold">
+                                          <p:stCondLst>
+                                            <p:cond delay="0"/>
+                                          </p:stCondLst>
+                                        </p:cTn>
+                                        <p:tgtEl>
+                                          <p:spTgt spid="4"/>
+                                        </p:tgtEl>
+                                        <p:attrNameLst>
+                                          <p:attrName>style.visibility</p:attrName>
+                                        </p:attrNameLst>
+                                      </p:cBhvr>
+                                      <p:to>
+                                        <p:strVal val="visible"/>
+                                      </p:to>
+                                    </p:set>
+                                    <p:animEffect transition="in" filter="fade">
+                                      <p:cBhvr>
+                                        <p:cTn id="7" dur="500"/>
+                                        <p:tgtEl>
+                                          <p:spTgt spid="4"/>
+                                        </p:tgtEl>
+                                      </p:cBhvr>
+                                    </p:animEffect>
+                                  </p:childTnLst>
+                                </p:cTn>
+                              </p:par>
+                            </p:childTnLst>
+                          </p:cTn>
+                        </p:par>
+                      </p:childTnLst>
+                    </p:cTn>
+                  </p:par>
+                </p:childTnLst>
+              </p:cTn>
+              <p:prevCondLst>
+                <p:cond evt="onPrev" delay="0">
+                  <p:tgtEl>
+                    <p:sldTgt/>
+                  </p:tgtEl>
+                </p:cond>
+              </p:prevCondLst>
+              <p:nextCondLst>
+                <p:cond evt="onNext" delay="0">
+                  <p:tgtEl>
+                    <p:sldTgt/>
+                  </p:tgtEl>
+                </p:cond>
+              </p:nextCondLst>
+            </p:seq>
+          </p:childTnLst>
+        </p:cTn>
+      </p:par>
+    </p:tnLst>
+    <p:bldLst>
+      <p:bldP spid="4" grpId="0" animBg="1"/>
+    </p:bldLst>
+  </p:timing>
+</p:sld>
+</file>
+
+<file path=ppt/slides/slide17.xml><?xml version="1.0" encoding="utf-8"?>
+<p:sld xmlns:a="http://schemas.openxmlformats.org/drawingml/2006/main" xmlns:r="http://schemas.openxmlformats.org/officeDocument/2006/relationships" xmlns:p="http://schemas.openxmlformats.org/presentationml/2006/main">
+  <p:cSld>
+    <p:spTree>
+      <p:nvGrpSpPr>
+        <p:cNvPr id="1" name=""/>
+        <p:cNvGrpSpPr/>
+        <p:nvPr/>
+      </p:nvGrpSpPr>
+      <p:grpSpPr>
+        <a:xfrm>
+          <a:off x="0" y="0"/>
+          <a:ext cx="0" cy="0"/>
+          <a:chOff x="0" y="0"/>
+          <a:chExt cx="0" cy="0"/>
+        </a:xfrm>
+      </p:grpSpPr>
+      <p:sp>
+        <p:nvSpPr>
+          <p:cNvPr id="2" name="Title 1"/>
+          <p:cNvSpPr>
+            <a:spLocks noGrp="1"/>
+          </p:cNvSpPr>
+          <p:nvPr>
+            <p:ph type="title"/>
+          </p:nvPr>
+        </p:nvSpPr>
+        <p:spPr>
+          <a:xfrm>
+            <a:off x="914400" y="384048"/>
+            <a:ext cx="7772400" cy="968502"/>
+          </a:xfrm>
+        </p:spPr>
+        <p:txBody>
+          <a:bodyPr/>
+          <a:lstStyle/>
+          <a:p>
+            <a:r>
+              <a:rPr lang="en-CA" dirty="0"/>
+              <a:t>Interfaces… What and why?</a:t>
+            </a:r>
+          </a:p>
+        </p:txBody>
+      </p:sp>
+      <p:sp>
+        <p:nvSpPr>
+          <p:cNvPr id="3" name="Content Placeholder 2"/>
+          <p:cNvSpPr>
+            <a:spLocks noGrp="1"/>
+          </p:cNvSpPr>
+          <p:nvPr>
+            <p:ph idx="1"/>
+          </p:nvPr>
+        </p:nvSpPr>
+        <p:spPr>
+          <a:xfrm>
+            <a:off x="304800" y="1428750"/>
+            <a:ext cx="8839200" cy="3337920"/>
+          </a:xfrm>
+        </p:spPr>
+        <p:txBody>
+          <a:bodyPr>
+            <a:normAutofit fontScale="92500" lnSpcReduction="10000"/>
+          </a:bodyPr>
+          <a:lstStyle/>
+          <a:p>
+            <a:r>
+              <a:rPr lang="en-CA" dirty="0"/>
+              <a:t>Interface classes</a:t>
+            </a:r>
+          </a:p>
+          <a:p>
+            <a:r>
+              <a:rPr lang="en-CA" dirty="0"/>
+              <a:t>It’s ONLY methods</a:t>
+            </a:r>
+          </a:p>
+          <a:p>
+            <a:r>
+              <a:rPr lang="en-CA" dirty="0"/>
+              <a:t>NO properties/variables</a:t>
+            </a:r>
+          </a:p>
+          <a:p>
+            <a:pPr lvl="1"/>
+            <a:r>
+              <a:rPr lang="en-CA" dirty="0"/>
+              <a:t>CATCH is: there’s no mechanism to STOP you from adding properties/variables</a:t>
+            </a:r>
+          </a:p>
+          <a:p>
+            <a:pPr lvl="2"/>
+            <a:r>
+              <a:rPr lang="en-CA" dirty="0"/>
+              <a:t>But if you do, then you are evil and people will not be your friend any more	</a:t>
+            </a:r>
+          </a:p>
+          <a:p>
+            <a:pPr lvl="2"/>
+            <a:r>
+              <a:rPr lang="en-CA" dirty="0"/>
+              <a:t>i.e. Just don’t do it. </a:t>
+            </a:r>
+          </a:p>
+        </p:txBody>
+      </p:sp>
+      <p:sp>
+        <p:nvSpPr>
+          <p:cNvPr id="4" name="AutoShape 6"/>
+          <p:cNvSpPr>
+            <a:spLocks noChangeArrowheads="1"/>
+          </p:cNvSpPr>
+          <p:nvPr/>
+        </p:nvSpPr>
+        <p:spPr bwMode="auto">
+          <a:xfrm>
+            <a:off x="8534400" y="4800600"/>
+            <a:ext cx="609600" cy="342900"/>
+          </a:xfrm>
+          <a:prstGeom prst="rightArrow">
+            <a:avLst>
+              <a:gd name="adj1" fmla="val 50000"/>
+              <a:gd name="adj2" fmla="val 33333"/>
+            </a:avLst>
+          </a:prstGeom>
+          <a:noFill/>
+          <a:ln w="19050">
+            <a:solidFill>
+              <a:srgbClr val="969696"/>
+            </a:solidFill>
+            <a:miter lim="800000"/>
+            <a:headEnd/>
+            <a:tailEnd/>
+          </a:ln>
+        </p:spPr>
+        <p:txBody>
+          <a:bodyPr wrap="none" anchor="ctr"/>
+          <a:lstStyle/>
+          <a:p>
+            <a:endParaRPr lang="en-CA"/>
+          </a:p>
+        </p:txBody>
+      </p:sp>
+    </p:spTree>
+    <p:extLst>
+      <p:ext uri="{BB962C8B-B14F-4D97-AF65-F5344CB8AC3E}">
+        <p14:creationId xmlns:p14="http://schemas.microsoft.com/office/powerpoint/2010/main" val="1370008173"/>
+      </p:ext>
+    </p:extLst>
+  </p:cSld>
+  <p:clrMapOvr>
+    <a:masterClrMapping/>
+  </p:clrMapOvr>
+  <p:timing>
+    <p:tnLst>
+      <p:par>
+        <p:cTn id="1" dur="indefinite" restart="never" nodeType="tmRoot">
+          <p:childTnLst>
+            <p:seq concurrent="1" nextAc="seek">
+              <p:cTn id="2" dur="indefinite" nodeType="mainSeq">
+                <p:childTnLst>
+                  <p:par>
+                    <p:cTn id="3" fill="hold">
+                      <p:stCondLst>
+                        <p:cond delay="indefinite"/>
+                      </p:stCondLst>
+                      <p:childTnLst>
+                        <p:par>
+                          <p:cTn id="4" fill="hold">
+                            <p:stCondLst>
+                              <p:cond delay="0"/>
+                            </p:stCondLst>
+                            <p:childTnLst>
+                              <p:par>
+                                <p:cTn id="5" presetID="10" presetClass="entr" presetSubtype="0" fill="hold" grpId="0" nodeType="clickEffect">
+                                  <p:stCondLst>
+                                    <p:cond delay="0"/>
+                                  </p:stCondLst>
+                                  <p:childTnLst>
+                                    <p:set>
+                                      <p:cBhvr>
+                                        <p:cTn id="6" dur="1" fill="hold">
+                                          <p:stCondLst>
+                                            <p:cond delay="0"/>
+                                          </p:stCondLst>
+                                        </p:cTn>
+                                        <p:tgtEl>
+                                          <p:spTgt spid="4"/>
+                                        </p:tgtEl>
+                                        <p:attrNameLst>
+                                          <p:attrName>style.visibility</p:attrName>
+                                        </p:attrNameLst>
+                                      </p:cBhvr>
+                                      <p:to>
+                                        <p:strVal val="visible"/>
+                                      </p:to>
+                                    </p:set>
+                                    <p:animEffect transition="in" filter="fade">
+                                      <p:cBhvr>
+                                        <p:cTn id="7" dur="500"/>
+                                        <p:tgtEl>
+                                          <p:spTgt spid="4"/>
+                                        </p:tgtEl>
+                                      </p:cBhvr>
+                                    </p:animEffect>
+                                  </p:childTnLst>
+                                </p:cTn>
+                              </p:par>
+                            </p:childTnLst>
+                          </p:cTn>
+                        </p:par>
+                      </p:childTnLst>
+                    </p:cTn>
+                  </p:par>
+                </p:childTnLst>
+              </p:cTn>
+              <p:prevCondLst>
+                <p:cond evt="onPrev" delay="0">
+                  <p:tgtEl>
+                    <p:sldTgt/>
+                  </p:tgtEl>
+                </p:cond>
+              </p:prevCondLst>
+              <p:nextCondLst>
+                <p:cond evt="onNext" delay="0">
+                  <p:tgtEl>
+                    <p:sldTgt/>
+                  </p:tgtEl>
+                </p:cond>
+              </p:nextCondLst>
+            </p:seq>
+          </p:childTnLst>
+        </p:cTn>
+      </p:par>
+    </p:tnLst>
+    <p:bldLst>
+      <p:bldP spid="4" grpId="0" animBg="1"/>
+    </p:bldLst>
+  </p:timing>
+</p:sld>
+</file>
+
+<file path=ppt/slides/slide18.xml><?xml version="1.0" encoding="utf-8"?>
+<p:sld xmlns:a="http://schemas.openxmlformats.org/drawingml/2006/main" xmlns:r="http://schemas.openxmlformats.org/officeDocument/2006/relationships" xmlns:p="http://schemas.openxmlformats.org/presentationml/2006/main">
+  <p:cSld>
+    <p:spTree>
+      <p:nvGrpSpPr>
+        <p:cNvPr id="1" name=""/>
+        <p:cNvGrpSpPr/>
+        <p:nvPr/>
+      </p:nvGrpSpPr>
+      <p:grpSpPr>
+        <a:xfrm>
+          <a:off x="0" y="0"/>
+          <a:ext cx="0" cy="0"/>
+          <a:chOff x="0" y="0"/>
+          <a:chExt cx="0" cy="0"/>
+        </a:xfrm>
+      </p:grpSpPr>
+      <p:sp>
+        <p:nvSpPr>
+          <p:cNvPr id="2" name="Title 1"/>
+          <p:cNvSpPr>
+            <a:spLocks noGrp="1"/>
+          </p:cNvSpPr>
+          <p:nvPr>
+            <p:ph type="title"/>
+          </p:nvPr>
+        </p:nvSpPr>
+        <p:spPr>
+          <a:xfrm>
+            <a:off x="914400" y="384048"/>
+            <a:ext cx="7772400" cy="968502"/>
+          </a:xfrm>
+        </p:spPr>
+        <p:txBody>
+          <a:bodyPr/>
+          <a:lstStyle/>
+          <a:p>
+            <a:r>
+              <a:rPr lang="en-CA" dirty="0"/>
+              <a:t>“Pure virtual” </a:t>
+            </a:r>
+          </a:p>
+        </p:txBody>
+      </p:sp>
+      <p:sp>
+        <p:nvSpPr>
+          <p:cNvPr id="3" name="Content Placeholder 2"/>
+          <p:cNvSpPr>
+            <a:spLocks noGrp="1"/>
+          </p:cNvSpPr>
+          <p:nvPr>
+            <p:ph idx="1"/>
+          </p:nvPr>
+        </p:nvSpPr>
+        <p:spPr>
+          <a:xfrm>
+            <a:off x="304800" y="1428750"/>
+            <a:ext cx="8839200" cy="3337920"/>
+          </a:xfrm>
+        </p:spPr>
+        <p:txBody>
+          <a:bodyPr>
+            <a:normAutofit/>
+          </a:bodyPr>
+          <a:lstStyle/>
+          <a:p>
+            <a:r>
+              <a:rPr lang="en-CA" dirty="0"/>
+              <a:t>Virtual at the start</a:t>
+            </a:r>
+          </a:p>
+          <a:p>
+            <a:r>
+              <a:rPr lang="en-CA" dirty="0"/>
+              <a:t>“=</a:t>
+            </a:r>
+            <a:r>
+              <a:rPr lang="en-CA" dirty="0">
+                <a:latin typeface="Courier New" panose="02070309020205020404" pitchFamily="49" charset="0"/>
+                <a:cs typeface="Courier New" panose="02070309020205020404" pitchFamily="49" charset="0"/>
+              </a:rPr>
+              <a:t> 0</a:t>
+            </a:r>
+            <a:r>
+              <a:rPr lang="en-CA" dirty="0"/>
+              <a:t>” at the end of the definition:</a:t>
+            </a:r>
+          </a:p>
+          <a:p>
+            <a:r>
+              <a:rPr lang="en-CA" dirty="0">
+                <a:latin typeface="Courier New" panose="02070309020205020404" pitchFamily="49" charset="0"/>
+                <a:cs typeface="Courier New" panose="02070309020205020404" pitchFamily="49" charset="0"/>
+              </a:rPr>
+              <a:t>void </a:t>
+            </a:r>
+            <a:r>
+              <a:rPr lang="en-CA" dirty="0" err="1">
+                <a:latin typeface="Courier New" panose="02070309020205020404" pitchFamily="49" charset="0"/>
+                <a:cs typeface="Courier New" panose="02070309020205020404" pitchFamily="49" charset="0"/>
+              </a:rPr>
+              <a:t>KillAllHumans</a:t>
+            </a:r>
+            <a:r>
+              <a:rPr lang="en-CA" dirty="0">
+                <a:latin typeface="Courier New" panose="02070309020205020404" pitchFamily="49" charset="0"/>
+                <a:cs typeface="Courier New" panose="02070309020205020404" pitchFamily="49" charset="0"/>
+              </a:rPr>
+              <a:t>(void);</a:t>
+            </a:r>
+          </a:p>
+          <a:p>
+            <a:r>
+              <a:rPr lang="en-CA" dirty="0">
+                <a:latin typeface="Courier New" panose="02070309020205020404" pitchFamily="49" charset="0"/>
+                <a:cs typeface="Courier New" panose="02070309020205020404" pitchFamily="49" charset="0"/>
+              </a:rPr>
+              <a:t>virtual </a:t>
+            </a:r>
+            <a:r>
+              <a:rPr lang="en-CA" dirty="0" err="1">
+                <a:latin typeface="Courier New" panose="02070309020205020404" pitchFamily="49" charset="0"/>
+                <a:cs typeface="Courier New" panose="02070309020205020404" pitchFamily="49" charset="0"/>
+              </a:rPr>
+              <a:t>KillAllHumans</a:t>
+            </a:r>
+            <a:r>
+              <a:rPr lang="en-CA" dirty="0">
+                <a:latin typeface="Courier New" panose="02070309020205020404" pitchFamily="49" charset="0"/>
+                <a:cs typeface="Courier New" panose="02070309020205020404" pitchFamily="49" charset="0"/>
+              </a:rPr>
+              <a:t>(void);</a:t>
+            </a:r>
+          </a:p>
+          <a:p>
+            <a:r>
+              <a:rPr lang="en-CA" dirty="0">
+                <a:latin typeface="Courier New" panose="02070309020205020404" pitchFamily="49" charset="0"/>
+                <a:cs typeface="Courier New" panose="02070309020205020404" pitchFamily="49" charset="0"/>
+              </a:rPr>
+              <a:t>virtual </a:t>
+            </a:r>
+            <a:r>
+              <a:rPr lang="en-CA" dirty="0" err="1">
+                <a:latin typeface="Courier New" panose="02070309020205020404" pitchFamily="49" charset="0"/>
+                <a:cs typeface="Courier New" panose="02070309020205020404" pitchFamily="49" charset="0"/>
+              </a:rPr>
+              <a:t>KillAllHumans</a:t>
+            </a:r>
+            <a:r>
+              <a:rPr lang="en-CA" dirty="0">
+                <a:latin typeface="Courier New" panose="02070309020205020404" pitchFamily="49" charset="0"/>
+                <a:cs typeface="Courier New" panose="02070309020205020404" pitchFamily="49" charset="0"/>
+              </a:rPr>
+              <a:t>(void) = 0;</a:t>
+            </a:r>
+          </a:p>
+        </p:txBody>
+      </p:sp>
+      <p:sp>
+        <p:nvSpPr>
+          <p:cNvPr id="4" name="AutoShape 6"/>
+          <p:cNvSpPr>
+            <a:spLocks noChangeArrowheads="1"/>
+          </p:cNvSpPr>
+          <p:nvPr/>
+        </p:nvSpPr>
+        <p:spPr bwMode="auto">
+          <a:xfrm>
+            <a:off x="8534400" y="4800600"/>
+            <a:ext cx="609600" cy="342900"/>
+          </a:xfrm>
+          <a:prstGeom prst="rightArrow">
+            <a:avLst>
+              <a:gd name="adj1" fmla="val 50000"/>
+              <a:gd name="adj2" fmla="val 33333"/>
+            </a:avLst>
+          </a:prstGeom>
+          <a:noFill/>
+          <a:ln w="19050">
+            <a:solidFill>
+              <a:srgbClr val="969696"/>
+            </a:solidFill>
+            <a:miter lim="800000"/>
+            <a:headEnd/>
+            <a:tailEnd/>
+          </a:ln>
+        </p:spPr>
+        <p:txBody>
+          <a:bodyPr wrap="none" anchor="ctr"/>
+          <a:lstStyle/>
+          <a:p>
+            <a:endParaRPr lang="en-CA"/>
+          </a:p>
+        </p:txBody>
+      </p:sp>
+    </p:spTree>
+    <p:extLst>
+      <p:ext uri="{BB962C8B-B14F-4D97-AF65-F5344CB8AC3E}">
+        <p14:creationId xmlns:p14="http://schemas.microsoft.com/office/powerpoint/2010/main" val="2406003678"/>
+      </p:ext>
+    </p:extLst>
+  </p:cSld>
+  <p:clrMapOvr>
+    <a:masterClrMapping/>
+  </p:clrMapOvr>
+  <p:timing>
+    <p:tnLst>
+      <p:par>
+        <p:cTn id="1" dur="indefinite" restart="never" nodeType="tmRoot">
+          <p:childTnLst>
+            <p:seq concurrent="1" nextAc="seek">
+              <p:cTn id="2" dur="indefinite" nodeType="mainSeq">
+                <p:childTnLst>
+                  <p:par>
+                    <p:cTn id="3" fill="hold">
+                      <p:stCondLst>
+                        <p:cond delay="indefinite"/>
+                      </p:stCondLst>
+                      <p:childTnLst>
+                        <p:par>
+                          <p:cTn id="4" fill="hold">
+                            <p:stCondLst>
+                              <p:cond delay="0"/>
+                            </p:stCondLst>
+                            <p:childTnLst>
+                              <p:par>
+                                <p:cTn id="5" presetID="10" presetClass="entr" presetSubtype="0" fill="hold" grpId="0" nodeType="clickEffect">
+                                  <p:stCondLst>
+                                    <p:cond delay="0"/>
+                                  </p:stCondLst>
+                                  <p:childTnLst>
+                                    <p:set>
+                                      <p:cBhvr>
+                                        <p:cTn id="6" dur="1" fill="hold">
+                                          <p:stCondLst>
+                                            <p:cond delay="0"/>
+                                          </p:stCondLst>
+                                        </p:cTn>
+                                        <p:tgtEl>
+                                          <p:spTgt spid="4"/>
+                                        </p:tgtEl>
+                                        <p:attrNameLst>
+                                          <p:attrName>style.visibility</p:attrName>
+                                        </p:attrNameLst>
+                                      </p:cBhvr>
+                                      <p:to>
+                                        <p:strVal val="visible"/>
+                                      </p:to>
+                                    </p:set>
+                                    <p:animEffect transition="in" filter="fade">
+                                      <p:cBhvr>
+                                        <p:cTn id="7" dur="500"/>
+                                        <p:tgtEl>
+                                          <p:spTgt spid="4"/>
+                                        </p:tgtEl>
+                                      </p:cBhvr>
+                                    </p:animEffect>
+                                  </p:childTnLst>
+                                </p:cTn>
+                              </p:par>
+                            </p:childTnLst>
+                          </p:cTn>
+                        </p:par>
+                      </p:childTnLst>
+                    </p:cTn>
+                  </p:par>
+                </p:childTnLst>
+              </p:cTn>
+              <p:prevCondLst>
+                <p:cond evt="onPrev" delay="0">
+                  <p:tgtEl>
+                    <p:sldTgt/>
+                  </p:tgtEl>
+                </p:cond>
+              </p:prevCondLst>
+              <p:nextCondLst>
+                <p:cond evt="onNext" delay="0">
+                  <p:tgtEl>
+                    <p:sldTgt/>
+                  </p:tgtEl>
+                </p:cond>
+              </p:nextCondLst>
+            </p:seq>
+          </p:childTnLst>
+        </p:cTn>
+      </p:par>
+    </p:tnLst>
+    <p:bldLst>
+      <p:bldP spid="4" grpId="0" animBg="1"/>
+    </p:bldLst>
+  </p:timing>
+</p:sld>
+</file>
+
+<file path=ppt/slides/slide19.xml><?xml version="1.0" encoding="utf-8"?>
+<p:sld xmlns:a="http://schemas.openxmlformats.org/drawingml/2006/main" xmlns:r="http://schemas.openxmlformats.org/officeDocument/2006/relationships" xmlns:p="http://schemas.openxmlformats.org/presentationml/2006/main">
+  <p:cSld>
+    <p:spTree>
+      <p:nvGrpSpPr>
+        <p:cNvPr id="1" name=""/>
+        <p:cNvGrpSpPr/>
+        <p:nvPr/>
+      </p:nvGrpSpPr>
+      <p:grpSpPr>
+        <a:xfrm>
+          <a:off x="0" y="0"/>
+          <a:ext cx="0" cy="0"/>
+          <a:chOff x="0" y="0"/>
+          <a:chExt cx="0" cy="0"/>
+        </a:xfrm>
+      </p:grpSpPr>
+      <p:sp>
+        <p:nvSpPr>
+          <p:cNvPr id="2" name="Title 1"/>
+          <p:cNvSpPr>
+            <a:spLocks noGrp="1"/>
+          </p:cNvSpPr>
+          <p:nvPr>
+            <p:ph type="title"/>
+          </p:nvPr>
+        </p:nvSpPr>
+        <p:spPr>
+          <a:xfrm>
+            <a:off x="914400" y="384048"/>
+            <a:ext cx="7772400" cy="968502"/>
+          </a:xfrm>
+        </p:spPr>
+        <p:txBody>
+          <a:bodyPr/>
+          <a:lstStyle/>
+          <a:p>
+            <a:r>
+              <a:rPr lang="en-CA" dirty="0"/>
+              <a:t>“Pure virtual” class </a:t>
+            </a:r>
+          </a:p>
+        </p:txBody>
+      </p:sp>
+      <p:sp>
+        <p:nvSpPr>
+          <p:cNvPr id="3" name="Content Placeholder 2"/>
+          <p:cNvSpPr>
+            <a:spLocks noGrp="1"/>
+          </p:cNvSpPr>
+          <p:nvPr>
+            <p:ph idx="1"/>
+          </p:nvPr>
+        </p:nvSpPr>
+        <p:spPr>
+          <a:xfrm>
+            <a:off x="304800" y="1428750"/>
+            <a:ext cx="8839200" cy="3337920"/>
+          </a:xfrm>
+        </p:spPr>
+        <p:txBody>
+          <a:bodyPr>
+            <a:normAutofit/>
+          </a:bodyPr>
+          <a:lstStyle/>
+          <a:p>
+            <a:r>
+              <a:rPr lang="en-CA" dirty="0"/>
+              <a:t>If any method in the class has a “= 0” then the class is called “pure virtual”</a:t>
+            </a:r>
+          </a:p>
+          <a:p>
+            <a:r>
+              <a:rPr lang="en-CA" dirty="0"/>
+              <a:t>…and it CAN NOT be created.</a:t>
+            </a:r>
+          </a:p>
+          <a:p>
+            <a:r>
+              <a:rPr lang="en-CA" dirty="0">
+                <a:latin typeface="Courier New" panose="02070309020205020404" pitchFamily="49" charset="0"/>
+                <a:cs typeface="Courier New" panose="02070309020205020404" pitchFamily="49" charset="0"/>
+              </a:rPr>
+              <a:t>virtual </a:t>
+            </a:r>
+            <a:r>
+              <a:rPr lang="en-CA" dirty="0" err="1">
+                <a:latin typeface="Courier New" panose="02070309020205020404" pitchFamily="49" charset="0"/>
+                <a:cs typeface="Courier New" panose="02070309020205020404" pitchFamily="49" charset="0"/>
+              </a:rPr>
+              <a:t>KillAllHumans</a:t>
+            </a:r>
+            <a:r>
+              <a:rPr lang="en-CA" dirty="0">
+                <a:latin typeface="Courier New" panose="02070309020205020404" pitchFamily="49" charset="0"/>
+                <a:cs typeface="Courier New" panose="02070309020205020404" pitchFamily="49" charset="0"/>
+              </a:rPr>
+              <a:t>(void) = 0;</a:t>
+            </a:r>
+          </a:p>
+        </p:txBody>
+      </p:sp>
+      <p:sp>
+        <p:nvSpPr>
+          <p:cNvPr id="4" name="AutoShape 6"/>
+          <p:cNvSpPr>
+            <a:spLocks noChangeArrowheads="1"/>
+          </p:cNvSpPr>
+          <p:nvPr/>
+        </p:nvSpPr>
+        <p:spPr bwMode="auto">
+          <a:xfrm>
+            <a:off x="8534400" y="4800600"/>
+            <a:ext cx="609600" cy="342900"/>
+          </a:xfrm>
+          <a:prstGeom prst="rightArrow">
+            <a:avLst>
+              <a:gd name="adj1" fmla="val 50000"/>
+              <a:gd name="adj2" fmla="val 33333"/>
+            </a:avLst>
+          </a:prstGeom>
+          <a:noFill/>
+          <a:ln w="19050">
+            <a:solidFill>
+              <a:srgbClr val="969696"/>
+            </a:solidFill>
+            <a:miter lim="800000"/>
+            <a:headEnd/>
+            <a:tailEnd/>
+          </a:ln>
+        </p:spPr>
+        <p:txBody>
+          <a:bodyPr wrap="none" anchor="ctr"/>
+          <a:lstStyle/>
+          <a:p>
+            <a:endParaRPr lang="en-CA"/>
+          </a:p>
+        </p:txBody>
+      </p:sp>
+    </p:spTree>
+    <p:extLst>
+      <p:ext uri="{BB962C8B-B14F-4D97-AF65-F5344CB8AC3E}">
+        <p14:creationId xmlns:p14="http://schemas.microsoft.com/office/powerpoint/2010/main" val="3069936266"/>
+      </p:ext>
+    </p:extLst>
+  </p:cSld>
+  <p:clrMapOvr>
+    <a:masterClrMapping/>
+  </p:clrMapOvr>
+  <p:timing>
+    <p:tnLst>
+      <p:par>
+        <p:cTn id="1" dur="indefinite" restart="never" nodeType="tmRoot">
+          <p:childTnLst>
+            <p:seq concurrent="1" nextAc="seek">
+              <p:cTn id="2" dur="indefinite" nodeType="mainSeq">
+                <p:childTnLst>
+                  <p:par>
+                    <p:cTn id="3" fill="hold">
+                      <p:stCondLst>
+                        <p:cond delay="indefinite"/>
+                      </p:stCondLst>
+                      <p:childTnLst>
+                        <p:par>
+                          <p:cTn id="4" fill="hold">
+                            <p:stCondLst>
+                              <p:cond delay="0"/>
+                            </p:stCondLst>
+                            <p:childTnLst>
+                              <p:par>
+                                <p:cTn id="5" presetID="10" presetClass="entr" presetSubtype="0" fill="hold" grpId="0" nodeType="clickEffect">
+                                  <p:stCondLst>
+                                    <p:cond delay="0"/>
+                                  </p:stCondLst>
+                                  <p:childTnLst>
+                                    <p:set>
+                                      <p:cBhvr>
+                                        <p:cTn id="6" dur="1" fill="hold">
+                                          <p:stCondLst>
+                                            <p:cond delay="0"/>
+                                          </p:stCondLst>
+                                        </p:cTn>
+                                        <p:tgtEl>
+                                          <p:spTgt spid="4"/>
+                                        </p:tgtEl>
+                                        <p:attrNameLst>
+                                          <p:attrName>style.visibility</p:attrName>
+                                        </p:attrNameLst>
+                                      </p:cBhvr>
+                                      <p:to>
+                                        <p:strVal val="visible"/>
+                                      </p:to>
+                                    </p:set>
+                                    <p:animEffect transition="in" filter="fade">
+                                      <p:cBhvr>
+                                        <p:cTn id="7" dur="500"/>
+                                        <p:tgtEl>
+                                          <p:spTgt spid="4"/>
+                                        </p:tgtEl>
+                                      </p:cBhvr>
+                                    </p:animEffect>
+                                  </p:childTnLst>
+                                </p:cTn>
+                              </p:par>
+                            </p:childTnLst>
+                          </p:cTn>
+                        </p:par>
+                      </p:childTnLst>
+                    </p:cTn>
+                  </p:par>
+                </p:childTnLst>
+              </p:cTn>
+              <p:prevCondLst>
+                <p:cond evt="onPrev" delay="0">
+                  <p:tgtEl>
+                    <p:sldTgt/>
+                  </p:tgtEl>
+                </p:cond>
+              </p:prevCondLst>
+              <p:nextCondLst>
+                <p:cond evt="onNext" delay="0">
+                  <p:tgtEl>
+                    <p:sldTgt/>
+                  </p:tgtEl>
+                </p:cond>
+              </p:nextCondLst>
+            </p:seq>
+          </p:childTnLst>
+        </p:cTn>
+      </p:par>
+    </p:tnLst>
+    <p:bldLst>
+      <p:bldP spid="4" grpId="0" animBg="1"/>
+    </p:bldLst>
+  </p:timing>
 </p:sld>
 </file>
 
@@ -8112,6 +11445,1340 @@
     <a:masterClrMapping/>
   </p:clrMapOvr>
   <p:transition/>
+</p:sld>
+</file>
+
+<file path=ppt/slides/slide5.xml><?xml version="1.0" encoding="utf-8"?>
+<p:sld xmlns:a="http://schemas.openxmlformats.org/drawingml/2006/main" xmlns:r="http://schemas.openxmlformats.org/officeDocument/2006/relationships" xmlns:p="http://schemas.openxmlformats.org/presentationml/2006/main">
+  <p:cSld>
+    <p:spTree>
+      <p:nvGrpSpPr>
+        <p:cNvPr id="1" name=""/>
+        <p:cNvGrpSpPr/>
+        <p:nvPr/>
+      </p:nvGrpSpPr>
+      <p:grpSpPr>
+        <a:xfrm>
+          <a:off x="0" y="0"/>
+          <a:ext cx="0" cy="0"/>
+          <a:chOff x="0" y="0"/>
+          <a:chExt cx="0" cy="0"/>
+        </a:xfrm>
+      </p:grpSpPr>
+      <p:sp>
+        <p:nvSpPr>
+          <p:cNvPr id="2" name="Title 1"/>
+          <p:cNvSpPr>
+            <a:spLocks noGrp="1"/>
+          </p:cNvSpPr>
+          <p:nvPr>
+            <p:ph type="title"/>
+          </p:nvPr>
+        </p:nvSpPr>
+        <p:spPr>
+          <a:xfrm>
+            <a:off x="914400" y="384048"/>
+            <a:ext cx="7772400" cy="1349502"/>
+          </a:xfrm>
+        </p:spPr>
+        <p:txBody>
+          <a:bodyPr/>
+          <a:lstStyle/>
+          <a:p>
+            <a:r>
+              <a:rPr lang="en-CA" dirty="0"/>
+              <a:t>Inheritance : Regular compile time </a:t>
+            </a:r>
+            <a:r>
+              <a:rPr lang="en-CA" dirty="0" err="1"/>
+              <a:t>NON-Polymorphic</a:t>
+            </a:r>
+            <a:endParaRPr lang="en-CA" dirty="0"/>
+          </a:p>
+        </p:txBody>
+      </p:sp>
+      <p:sp>
+        <p:nvSpPr>
+          <p:cNvPr id="3" name="Content Placeholder 2"/>
+          <p:cNvSpPr>
+            <a:spLocks noGrp="1"/>
+          </p:cNvSpPr>
+          <p:nvPr>
+            <p:ph idx="1"/>
+          </p:nvPr>
+        </p:nvSpPr>
+        <p:spPr>
+          <a:xfrm>
+            <a:off x="685800" y="2114550"/>
+            <a:ext cx="8229600" cy="2652120"/>
+          </a:xfrm>
+        </p:spPr>
+        <p:txBody>
+          <a:bodyPr>
+            <a:normAutofit/>
+          </a:bodyPr>
+          <a:lstStyle/>
+          <a:p>
+            <a:r>
+              <a:rPr lang="en-US" dirty="0" err="1"/>
+              <a:t>cMonster</a:t>
+            </a:r>
+            <a:r>
+              <a:rPr lang="en-US" dirty="0"/>
+              <a:t>* </a:t>
+            </a:r>
+            <a:r>
+              <a:rPr lang="en-US" dirty="0" err="1"/>
+              <a:t>pSally</a:t>
+            </a:r>
+            <a:r>
+              <a:rPr lang="en-US" dirty="0"/>
+              <a:t> = new </a:t>
+            </a:r>
+            <a:r>
+              <a:rPr lang="en-US" dirty="0" err="1"/>
+              <a:t>cSuperMonster</a:t>
+            </a:r>
+            <a:r>
+              <a:rPr lang="en-US" dirty="0"/>
+              <a:t>("sally");</a:t>
+            </a:r>
+          </a:p>
+          <a:p>
+            <a:r>
+              <a:rPr lang="en-US" dirty="0"/>
+              <a:t>new (right) controls what’s created</a:t>
+            </a:r>
+          </a:p>
+          <a:p>
+            <a:r>
+              <a:rPr lang="en-US" dirty="0"/>
+              <a:t>Type (left) is what we can access</a:t>
+            </a:r>
+            <a:endParaRPr lang="en-CA" dirty="0"/>
+          </a:p>
+          <a:p>
+            <a:pPr lvl="1"/>
+            <a:endParaRPr lang="en-CA" dirty="0"/>
+          </a:p>
+          <a:p>
+            <a:endParaRPr lang="en-CA" dirty="0"/>
+          </a:p>
+        </p:txBody>
+      </p:sp>
+      <p:sp>
+        <p:nvSpPr>
+          <p:cNvPr id="4" name="AutoShape 6"/>
+          <p:cNvSpPr>
+            <a:spLocks noChangeArrowheads="1"/>
+          </p:cNvSpPr>
+          <p:nvPr/>
+        </p:nvSpPr>
+        <p:spPr bwMode="auto">
+          <a:xfrm>
+            <a:off x="8534400" y="4800600"/>
+            <a:ext cx="609600" cy="342900"/>
+          </a:xfrm>
+          <a:prstGeom prst="rightArrow">
+            <a:avLst>
+              <a:gd name="adj1" fmla="val 50000"/>
+              <a:gd name="adj2" fmla="val 33333"/>
+            </a:avLst>
+          </a:prstGeom>
+          <a:noFill/>
+          <a:ln w="19050">
+            <a:solidFill>
+              <a:srgbClr val="969696"/>
+            </a:solidFill>
+            <a:miter lim="800000"/>
+            <a:headEnd/>
+            <a:tailEnd/>
+          </a:ln>
+        </p:spPr>
+        <p:txBody>
+          <a:bodyPr wrap="none" anchor="ctr"/>
+          <a:lstStyle/>
+          <a:p>
+            <a:endParaRPr lang="en-CA"/>
+          </a:p>
+        </p:txBody>
+      </p:sp>
+    </p:spTree>
+    <p:extLst>
+      <p:ext uri="{BB962C8B-B14F-4D97-AF65-F5344CB8AC3E}">
+        <p14:creationId xmlns:p14="http://schemas.microsoft.com/office/powerpoint/2010/main" val="153125564"/>
+      </p:ext>
+    </p:extLst>
+  </p:cSld>
+  <p:clrMapOvr>
+    <a:masterClrMapping/>
+  </p:clrMapOvr>
+  <p:timing>
+    <p:tnLst>
+      <p:par>
+        <p:cTn id="1" dur="indefinite" restart="never" nodeType="tmRoot">
+          <p:childTnLst>
+            <p:seq concurrent="1" nextAc="seek">
+              <p:cTn id="2" dur="indefinite" nodeType="mainSeq">
+                <p:childTnLst>
+                  <p:par>
+                    <p:cTn id="3" fill="hold">
+                      <p:stCondLst>
+                        <p:cond delay="indefinite"/>
+                      </p:stCondLst>
+                      <p:childTnLst>
+                        <p:par>
+                          <p:cTn id="4" fill="hold">
+                            <p:stCondLst>
+                              <p:cond delay="0"/>
+                            </p:stCondLst>
+                            <p:childTnLst>
+                              <p:par>
+                                <p:cTn id="5" presetID="10" presetClass="entr" presetSubtype="0" fill="hold" grpId="0" nodeType="clickEffect">
+                                  <p:stCondLst>
+                                    <p:cond delay="0"/>
+                                  </p:stCondLst>
+                                  <p:childTnLst>
+                                    <p:set>
+                                      <p:cBhvr>
+                                        <p:cTn id="6" dur="1" fill="hold">
+                                          <p:stCondLst>
+                                            <p:cond delay="0"/>
+                                          </p:stCondLst>
+                                        </p:cTn>
+                                        <p:tgtEl>
+                                          <p:spTgt spid="4"/>
+                                        </p:tgtEl>
+                                        <p:attrNameLst>
+                                          <p:attrName>style.visibility</p:attrName>
+                                        </p:attrNameLst>
+                                      </p:cBhvr>
+                                      <p:to>
+                                        <p:strVal val="visible"/>
+                                      </p:to>
+                                    </p:set>
+                                    <p:animEffect transition="in" filter="fade">
+                                      <p:cBhvr>
+                                        <p:cTn id="7" dur="500"/>
+                                        <p:tgtEl>
+                                          <p:spTgt spid="4"/>
+                                        </p:tgtEl>
+                                      </p:cBhvr>
+                                    </p:animEffect>
+                                  </p:childTnLst>
+                                </p:cTn>
+                              </p:par>
+                            </p:childTnLst>
+                          </p:cTn>
+                        </p:par>
+                      </p:childTnLst>
+                    </p:cTn>
+                  </p:par>
+                </p:childTnLst>
+              </p:cTn>
+              <p:prevCondLst>
+                <p:cond evt="onPrev" delay="0">
+                  <p:tgtEl>
+                    <p:sldTgt/>
+                  </p:tgtEl>
+                </p:cond>
+              </p:prevCondLst>
+              <p:nextCondLst>
+                <p:cond evt="onNext" delay="0">
+                  <p:tgtEl>
+                    <p:sldTgt/>
+                  </p:tgtEl>
+                </p:cond>
+              </p:nextCondLst>
+            </p:seq>
+          </p:childTnLst>
+        </p:cTn>
+      </p:par>
+    </p:tnLst>
+    <p:bldLst>
+      <p:bldP spid="4" grpId="0" animBg="1"/>
+    </p:bldLst>
+  </p:timing>
+</p:sld>
+</file>
+
+<file path=ppt/slides/slide6.xml><?xml version="1.0" encoding="utf-8"?>
+<p:sld xmlns:a="http://schemas.openxmlformats.org/drawingml/2006/main" xmlns:r="http://schemas.openxmlformats.org/officeDocument/2006/relationships" xmlns:p="http://schemas.openxmlformats.org/presentationml/2006/main" show="0">
+  <p:cSld>
+    <p:spTree>
+      <p:nvGrpSpPr>
+        <p:cNvPr id="1" name=""/>
+        <p:cNvGrpSpPr/>
+        <p:nvPr/>
+      </p:nvGrpSpPr>
+      <p:grpSpPr>
+        <a:xfrm>
+          <a:off x="0" y="0"/>
+          <a:ext cx="0" cy="0"/>
+          <a:chOff x="0" y="0"/>
+          <a:chExt cx="0" cy="0"/>
+        </a:xfrm>
+      </p:grpSpPr>
+      <p:sp>
+        <p:nvSpPr>
+          <p:cNvPr id="4" name="Rectangle: Rounded Corners 3">
+            <a:extLst>
+              <a:ext uri="{FF2B5EF4-FFF2-40B4-BE49-F238E27FC236}">
+                <a16:creationId xmlns:a16="http://schemas.microsoft.com/office/drawing/2014/main" id="{89221DBB-76DB-4E50-86EB-54D316A8F940}"/>
+              </a:ext>
+            </a:extLst>
+          </p:cNvPr>
+          <p:cNvSpPr/>
+          <p:nvPr/>
+        </p:nvSpPr>
+        <p:spPr>
+          <a:xfrm>
+            <a:off x="3733800" y="438150"/>
+            <a:ext cx="1676400" cy="1066800"/>
+          </a:xfrm>
+          <a:prstGeom prst="roundRect">
+            <a:avLst/>
+          </a:prstGeom>
+        </p:spPr>
+        <p:style>
+          <a:lnRef idx="1">
+            <a:schemeClr val="accent6"/>
+          </a:lnRef>
+          <a:fillRef idx="3">
+            <a:schemeClr val="accent6"/>
+          </a:fillRef>
+          <a:effectRef idx="2">
+            <a:schemeClr val="accent6"/>
+          </a:effectRef>
+          <a:fontRef idx="minor">
+            <a:schemeClr val="lt1"/>
+          </a:fontRef>
+        </p:style>
+        <p:txBody>
+          <a:bodyPr rtlCol="0" anchor="ctr"/>
+          <a:lstStyle/>
+          <a:p>
+            <a:pPr algn="ctr"/>
+            <a:r>
+              <a:rPr lang="en-US" dirty="0">
+                <a:solidFill>
+                  <a:schemeClr val="bg1"/>
+                </a:solidFill>
+              </a:rPr>
+              <a:t>Monster</a:t>
+            </a:r>
+          </a:p>
+          <a:p>
+            <a:pPr algn="ctr"/>
+            <a:r>
+              <a:rPr lang="en-US" dirty="0" err="1">
+                <a:solidFill>
+                  <a:schemeClr val="bg1"/>
+                </a:solidFill>
+              </a:rPr>
+              <a:t>locationXYZ</a:t>
+            </a:r>
+            <a:endParaRPr lang="en-CA" dirty="0">
+              <a:solidFill>
+                <a:schemeClr val="bg1"/>
+              </a:solidFill>
+            </a:endParaRPr>
+          </a:p>
+        </p:txBody>
+      </p:sp>
+      <p:sp>
+        <p:nvSpPr>
+          <p:cNvPr id="5" name="Rectangle: Rounded Corners 4">
+            <a:extLst>
+              <a:ext uri="{FF2B5EF4-FFF2-40B4-BE49-F238E27FC236}">
+                <a16:creationId xmlns:a16="http://schemas.microsoft.com/office/drawing/2014/main" id="{8089A44A-CE32-4FA9-9927-6F765FF48FF6}"/>
+              </a:ext>
+            </a:extLst>
+          </p:cNvPr>
+          <p:cNvSpPr/>
+          <p:nvPr/>
+        </p:nvSpPr>
+        <p:spPr>
+          <a:xfrm>
+            <a:off x="1295400" y="2561167"/>
+            <a:ext cx="1905000" cy="1066800"/>
+          </a:xfrm>
+          <a:prstGeom prst="roundRect">
+            <a:avLst/>
+          </a:prstGeom>
+        </p:spPr>
+        <p:style>
+          <a:lnRef idx="2">
+            <a:schemeClr val="accent1">
+              <a:shade val="50000"/>
+            </a:schemeClr>
+          </a:lnRef>
+          <a:fillRef idx="1">
+            <a:schemeClr val="accent1"/>
+          </a:fillRef>
+          <a:effectRef idx="0">
+            <a:schemeClr val="accent1"/>
+          </a:effectRef>
+          <a:fontRef idx="minor">
+            <a:schemeClr val="lt1"/>
+          </a:fontRef>
+        </p:style>
+        <p:txBody>
+          <a:bodyPr rtlCol="0" anchor="ctr"/>
+          <a:lstStyle/>
+          <a:p>
+            <a:pPr algn="ctr"/>
+            <a:r>
+              <a:rPr lang="en-US" dirty="0" err="1">
+                <a:solidFill>
+                  <a:schemeClr val="bg1"/>
+                </a:solidFill>
+              </a:rPr>
+              <a:t>cSuperMonster</a:t>
+            </a:r>
+            <a:endParaRPr lang="en-US" dirty="0">
+              <a:solidFill>
+                <a:schemeClr val="bg1"/>
+              </a:solidFill>
+            </a:endParaRPr>
+          </a:p>
+          <a:p>
+            <a:pPr algn="ctr"/>
+            <a:r>
+              <a:rPr lang="en-US" dirty="0">
+                <a:solidFill>
+                  <a:schemeClr val="bg1"/>
+                </a:solidFill>
+              </a:rPr>
+              <a:t>(</a:t>
+            </a:r>
+            <a:r>
+              <a:rPr lang="en-US" dirty="0" err="1">
+                <a:solidFill>
+                  <a:schemeClr val="bg1"/>
+                </a:solidFill>
+              </a:rPr>
+              <a:t>GiveBirth</a:t>
+            </a:r>
+            <a:r>
+              <a:rPr lang="en-US" dirty="0">
+                <a:solidFill>
+                  <a:schemeClr val="bg1"/>
+                </a:solidFill>
+              </a:rPr>
+              <a:t>)</a:t>
+            </a:r>
+            <a:endParaRPr lang="en-CA" dirty="0">
+              <a:solidFill>
+                <a:schemeClr val="bg1"/>
+              </a:solidFill>
+            </a:endParaRPr>
+          </a:p>
+        </p:txBody>
+      </p:sp>
+      <p:cxnSp>
+        <p:nvCxnSpPr>
+          <p:cNvPr id="16" name="Straight Arrow Connector 15">
+            <a:extLst>
+              <a:ext uri="{FF2B5EF4-FFF2-40B4-BE49-F238E27FC236}">
+                <a16:creationId xmlns:a16="http://schemas.microsoft.com/office/drawing/2014/main" id="{500FB6B0-AEE8-475A-A08A-29555711939A}"/>
+              </a:ext>
+            </a:extLst>
+          </p:cNvPr>
+          <p:cNvCxnSpPr>
+            <a:cxnSpLocks/>
+            <a:stCxn id="5" idx="0"/>
+            <a:endCxn id="4" idx="2"/>
+          </p:cNvCxnSpPr>
+          <p:nvPr/>
+        </p:nvCxnSpPr>
+        <p:spPr>
+          <a:xfrm flipV="1">
+            <a:off x="2247900" y="1504950"/>
+            <a:ext cx="2324100" cy="1056217"/>
+          </a:xfrm>
+          <a:prstGeom prst="straightConnector1">
+            <a:avLst/>
+          </a:prstGeom>
+          <a:ln w="76200">
+            <a:tailEnd type="triangle"/>
+          </a:ln>
+        </p:spPr>
+        <p:style>
+          <a:lnRef idx="1">
+            <a:schemeClr val="accent1"/>
+          </a:lnRef>
+          <a:fillRef idx="0">
+            <a:schemeClr val="accent1"/>
+          </a:fillRef>
+          <a:effectRef idx="0">
+            <a:schemeClr val="accent1"/>
+          </a:effectRef>
+          <a:fontRef idx="minor">
+            <a:schemeClr val="tx1"/>
+          </a:fontRef>
+        </p:style>
+      </p:cxnSp>
+      <p:sp>
+        <p:nvSpPr>
+          <p:cNvPr id="7" name="Rectangle: Rounded Corners 6">
+            <a:extLst>
+              <a:ext uri="{FF2B5EF4-FFF2-40B4-BE49-F238E27FC236}">
+                <a16:creationId xmlns:a16="http://schemas.microsoft.com/office/drawing/2014/main" id="{3A30A23A-55B1-27AA-5E4C-3AA4BBE41927}"/>
+              </a:ext>
+            </a:extLst>
+          </p:cNvPr>
+          <p:cNvSpPr/>
+          <p:nvPr/>
+        </p:nvSpPr>
+        <p:spPr>
+          <a:xfrm>
+            <a:off x="5867400" y="2571750"/>
+            <a:ext cx="1905000" cy="1066800"/>
+          </a:xfrm>
+          <a:prstGeom prst="roundRect">
+            <a:avLst/>
+          </a:prstGeom>
+        </p:spPr>
+        <p:style>
+          <a:lnRef idx="3">
+            <a:schemeClr val="lt1"/>
+          </a:lnRef>
+          <a:fillRef idx="1">
+            <a:schemeClr val="accent2"/>
+          </a:fillRef>
+          <a:effectRef idx="1">
+            <a:schemeClr val="accent2"/>
+          </a:effectRef>
+          <a:fontRef idx="minor">
+            <a:schemeClr val="lt1"/>
+          </a:fontRef>
+        </p:style>
+        <p:txBody>
+          <a:bodyPr rtlCol="0" anchor="ctr"/>
+          <a:lstStyle/>
+          <a:p>
+            <a:pPr algn="ctr"/>
+            <a:r>
+              <a:rPr lang="en-US" dirty="0" err="1">
+                <a:solidFill>
+                  <a:schemeClr val="bg1"/>
+                </a:solidFill>
+              </a:rPr>
+              <a:t>cFlyingMonster</a:t>
+            </a:r>
+            <a:endParaRPr lang="en-US" dirty="0">
+              <a:solidFill>
+                <a:schemeClr val="bg1"/>
+              </a:solidFill>
+            </a:endParaRPr>
+          </a:p>
+          <a:p>
+            <a:pPr algn="ctr"/>
+            <a:r>
+              <a:rPr lang="en-US" dirty="0">
+                <a:solidFill>
+                  <a:schemeClr val="bg1"/>
+                </a:solidFill>
+              </a:rPr>
+              <a:t>(Fly)</a:t>
+            </a:r>
+            <a:endParaRPr lang="en-CA" dirty="0">
+              <a:solidFill>
+                <a:schemeClr val="bg1"/>
+              </a:solidFill>
+            </a:endParaRPr>
+          </a:p>
+        </p:txBody>
+      </p:sp>
+      <p:cxnSp>
+        <p:nvCxnSpPr>
+          <p:cNvPr id="8" name="Straight Arrow Connector 7">
+            <a:extLst>
+              <a:ext uri="{FF2B5EF4-FFF2-40B4-BE49-F238E27FC236}">
+                <a16:creationId xmlns:a16="http://schemas.microsoft.com/office/drawing/2014/main" id="{D9430D04-A31E-D4AE-EC54-18744E112E7F}"/>
+              </a:ext>
+            </a:extLst>
+          </p:cNvPr>
+          <p:cNvCxnSpPr>
+            <a:cxnSpLocks/>
+            <a:stCxn id="7" idx="0"/>
+            <a:endCxn id="4" idx="2"/>
+          </p:cNvCxnSpPr>
+          <p:nvPr/>
+        </p:nvCxnSpPr>
+        <p:spPr>
+          <a:xfrm flipH="1" flipV="1">
+            <a:off x="4572000" y="1504950"/>
+            <a:ext cx="2247900" cy="1066800"/>
+          </a:xfrm>
+          <a:prstGeom prst="straightConnector1">
+            <a:avLst/>
+          </a:prstGeom>
+          <a:ln w="76200">
+            <a:tailEnd type="triangle"/>
+          </a:ln>
+        </p:spPr>
+        <p:style>
+          <a:lnRef idx="1">
+            <a:schemeClr val="accent1"/>
+          </a:lnRef>
+          <a:fillRef idx="0">
+            <a:schemeClr val="accent1"/>
+          </a:fillRef>
+          <a:effectRef idx="0">
+            <a:schemeClr val="accent1"/>
+          </a:effectRef>
+          <a:fontRef idx="minor">
+            <a:schemeClr val="tx1"/>
+          </a:fontRef>
+        </p:style>
+      </p:cxnSp>
+    </p:spTree>
+    <p:extLst>
+      <p:ext uri="{BB962C8B-B14F-4D97-AF65-F5344CB8AC3E}">
+        <p14:creationId xmlns:p14="http://schemas.microsoft.com/office/powerpoint/2010/main" val="2557766796"/>
+      </p:ext>
+    </p:extLst>
+  </p:cSld>
+  <p:clrMapOvr>
+    <a:masterClrMapping/>
+  </p:clrMapOvr>
+  <p:transition/>
+</p:sld>
+</file>
+
+<file path=ppt/slides/slide7.xml><?xml version="1.0" encoding="utf-8"?>
+<p:sld xmlns:a="http://schemas.openxmlformats.org/drawingml/2006/main" xmlns:r="http://schemas.openxmlformats.org/officeDocument/2006/relationships" xmlns:p="http://schemas.openxmlformats.org/presentationml/2006/main">
+  <p:cSld>
+    <p:spTree>
+      <p:nvGrpSpPr>
+        <p:cNvPr id="1" name=""/>
+        <p:cNvGrpSpPr/>
+        <p:nvPr/>
+      </p:nvGrpSpPr>
+      <p:grpSpPr>
+        <a:xfrm>
+          <a:off x="0" y="0"/>
+          <a:ext cx="0" cy="0"/>
+          <a:chOff x="0" y="0"/>
+          <a:chExt cx="0" cy="0"/>
+        </a:xfrm>
+      </p:grpSpPr>
+      <p:sp>
+        <p:nvSpPr>
+          <p:cNvPr id="2" name="Title 1"/>
+          <p:cNvSpPr>
+            <a:spLocks noGrp="1"/>
+          </p:cNvSpPr>
+          <p:nvPr>
+            <p:ph type="title"/>
+          </p:nvPr>
+        </p:nvSpPr>
+        <p:spPr>
+          <a:xfrm>
+            <a:off x="914400" y="384048"/>
+            <a:ext cx="7772400" cy="1349502"/>
+          </a:xfrm>
+        </p:spPr>
+        <p:txBody>
+          <a:bodyPr/>
+          <a:lstStyle/>
+          <a:p>
+            <a:r>
+              <a:rPr lang="en-CA" dirty="0"/>
+              <a:t>Inheritance : Regular compile time </a:t>
+            </a:r>
+            <a:r>
+              <a:rPr lang="en-CA" dirty="0" err="1"/>
+              <a:t>NON-Polymorphic</a:t>
+            </a:r>
+            <a:endParaRPr lang="en-CA" dirty="0"/>
+          </a:p>
+        </p:txBody>
+      </p:sp>
+      <p:sp>
+        <p:nvSpPr>
+          <p:cNvPr id="3" name="Content Placeholder 2"/>
+          <p:cNvSpPr>
+            <a:spLocks noGrp="1"/>
+          </p:cNvSpPr>
+          <p:nvPr>
+            <p:ph idx="1"/>
+          </p:nvPr>
+        </p:nvSpPr>
+        <p:spPr>
+          <a:xfrm>
+            <a:off x="685800" y="2114550"/>
+            <a:ext cx="8229600" cy="2652120"/>
+          </a:xfrm>
+        </p:spPr>
+        <p:txBody>
+          <a:bodyPr>
+            <a:normAutofit fontScale="92500"/>
+          </a:bodyPr>
+          <a:lstStyle/>
+          <a:p>
+            <a:r>
+              <a:rPr lang="en-CA" dirty="0"/>
+              <a:t>Compiler sets the call to the specific method based on the type.</a:t>
+            </a:r>
+          </a:p>
+          <a:p>
+            <a:r>
+              <a:rPr lang="en-CA" dirty="0"/>
+              <a:t>If it’s a </a:t>
+            </a:r>
+            <a:r>
+              <a:rPr lang="en-CA" dirty="0" err="1"/>
+              <a:t>cMonster</a:t>
+            </a:r>
+            <a:r>
+              <a:rPr lang="en-CA" dirty="0"/>
+              <a:t>, then it calls </a:t>
+            </a:r>
+            <a:r>
+              <a:rPr lang="en-CA" dirty="0" err="1"/>
+              <a:t>cMonster’s</a:t>
+            </a:r>
+            <a:r>
+              <a:rPr lang="en-CA" dirty="0"/>
+              <a:t> methods</a:t>
+            </a:r>
+          </a:p>
+          <a:p>
+            <a:r>
+              <a:rPr lang="en-CA" dirty="0"/>
+              <a:t>If it’s a </a:t>
+            </a:r>
+            <a:r>
+              <a:rPr lang="en-CA" dirty="0" err="1"/>
+              <a:t>SuperMonster</a:t>
+            </a:r>
+            <a:r>
+              <a:rPr lang="en-CA" dirty="0"/>
+              <a:t>, then it call </a:t>
+            </a:r>
+            <a:r>
+              <a:rPr lang="en-CA" dirty="0" err="1"/>
+              <a:t>SuperMonster’s</a:t>
+            </a:r>
+            <a:endParaRPr lang="en-CA" dirty="0"/>
+          </a:p>
+          <a:p>
+            <a:pPr lvl="1"/>
+            <a:endParaRPr lang="en-CA" dirty="0"/>
+          </a:p>
+          <a:p>
+            <a:endParaRPr lang="en-CA" dirty="0"/>
+          </a:p>
+        </p:txBody>
+      </p:sp>
+      <p:sp>
+        <p:nvSpPr>
+          <p:cNvPr id="4" name="AutoShape 6"/>
+          <p:cNvSpPr>
+            <a:spLocks noChangeArrowheads="1"/>
+          </p:cNvSpPr>
+          <p:nvPr/>
+        </p:nvSpPr>
+        <p:spPr bwMode="auto">
+          <a:xfrm>
+            <a:off x="8534400" y="4800600"/>
+            <a:ext cx="609600" cy="342900"/>
+          </a:xfrm>
+          <a:prstGeom prst="rightArrow">
+            <a:avLst>
+              <a:gd name="adj1" fmla="val 50000"/>
+              <a:gd name="adj2" fmla="val 33333"/>
+            </a:avLst>
+          </a:prstGeom>
+          <a:noFill/>
+          <a:ln w="19050">
+            <a:solidFill>
+              <a:srgbClr val="969696"/>
+            </a:solidFill>
+            <a:miter lim="800000"/>
+            <a:headEnd/>
+            <a:tailEnd/>
+          </a:ln>
+        </p:spPr>
+        <p:txBody>
+          <a:bodyPr wrap="none" anchor="ctr"/>
+          <a:lstStyle/>
+          <a:p>
+            <a:endParaRPr lang="en-CA"/>
+          </a:p>
+        </p:txBody>
+      </p:sp>
+    </p:spTree>
+    <p:extLst>
+      <p:ext uri="{BB962C8B-B14F-4D97-AF65-F5344CB8AC3E}">
+        <p14:creationId xmlns:p14="http://schemas.microsoft.com/office/powerpoint/2010/main" val="2185615156"/>
+      </p:ext>
+    </p:extLst>
+  </p:cSld>
+  <p:clrMapOvr>
+    <a:masterClrMapping/>
+  </p:clrMapOvr>
+  <p:timing>
+    <p:tnLst>
+      <p:par>
+        <p:cTn id="1" dur="indefinite" restart="never" nodeType="tmRoot">
+          <p:childTnLst>
+            <p:seq concurrent="1" nextAc="seek">
+              <p:cTn id="2" dur="indefinite" nodeType="mainSeq">
+                <p:childTnLst>
+                  <p:par>
+                    <p:cTn id="3" fill="hold">
+                      <p:stCondLst>
+                        <p:cond delay="indefinite"/>
+                      </p:stCondLst>
+                      <p:childTnLst>
+                        <p:par>
+                          <p:cTn id="4" fill="hold">
+                            <p:stCondLst>
+                              <p:cond delay="0"/>
+                            </p:stCondLst>
+                            <p:childTnLst>
+                              <p:par>
+                                <p:cTn id="5" presetID="10" presetClass="entr" presetSubtype="0" fill="hold" grpId="0" nodeType="clickEffect">
+                                  <p:stCondLst>
+                                    <p:cond delay="0"/>
+                                  </p:stCondLst>
+                                  <p:childTnLst>
+                                    <p:set>
+                                      <p:cBhvr>
+                                        <p:cTn id="6" dur="1" fill="hold">
+                                          <p:stCondLst>
+                                            <p:cond delay="0"/>
+                                          </p:stCondLst>
+                                        </p:cTn>
+                                        <p:tgtEl>
+                                          <p:spTgt spid="4"/>
+                                        </p:tgtEl>
+                                        <p:attrNameLst>
+                                          <p:attrName>style.visibility</p:attrName>
+                                        </p:attrNameLst>
+                                      </p:cBhvr>
+                                      <p:to>
+                                        <p:strVal val="visible"/>
+                                      </p:to>
+                                    </p:set>
+                                    <p:animEffect transition="in" filter="fade">
+                                      <p:cBhvr>
+                                        <p:cTn id="7" dur="500"/>
+                                        <p:tgtEl>
+                                          <p:spTgt spid="4"/>
+                                        </p:tgtEl>
+                                      </p:cBhvr>
+                                    </p:animEffect>
+                                  </p:childTnLst>
+                                </p:cTn>
+                              </p:par>
+                            </p:childTnLst>
+                          </p:cTn>
+                        </p:par>
+                      </p:childTnLst>
+                    </p:cTn>
+                  </p:par>
+                </p:childTnLst>
+              </p:cTn>
+              <p:prevCondLst>
+                <p:cond evt="onPrev" delay="0">
+                  <p:tgtEl>
+                    <p:sldTgt/>
+                  </p:tgtEl>
+                </p:cond>
+              </p:prevCondLst>
+              <p:nextCondLst>
+                <p:cond evt="onNext" delay="0">
+                  <p:tgtEl>
+                    <p:sldTgt/>
+                  </p:tgtEl>
+                </p:cond>
+              </p:nextCondLst>
+            </p:seq>
+          </p:childTnLst>
+        </p:cTn>
+      </p:par>
+    </p:tnLst>
+    <p:bldLst>
+      <p:bldP spid="4" grpId="0" animBg="1"/>
+    </p:bldLst>
+  </p:timing>
+</p:sld>
+</file>
+
+<file path=ppt/slides/slide8.xml><?xml version="1.0" encoding="utf-8"?>
+<p:sld xmlns:a="http://schemas.openxmlformats.org/drawingml/2006/main" xmlns:r="http://schemas.openxmlformats.org/officeDocument/2006/relationships" xmlns:p="http://schemas.openxmlformats.org/presentationml/2006/main">
+  <p:cSld>
+    <p:spTree>
+      <p:nvGrpSpPr>
+        <p:cNvPr id="1" name=""/>
+        <p:cNvGrpSpPr/>
+        <p:nvPr/>
+      </p:nvGrpSpPr>
+      <p:grpSpPr>
+        <a:xfrm>
+          <a:off x="0" y="0"/>
+          <a:ext cx="0" cy="0"/>
+          <a:chOff x="0" y="0"/>
+          <a:chExt cx="0" cy="0"/>
+        </a:xfrm>
+      </p:grpSpPr>
+      <p:sp>
+        <p:nvSpPr>
+          <p:cNvPr id="2" name="Title 1"/>
+          <p:cNvSpPr>
+            <a:spLocks noGrp="1"/>
+          </p:cNvSpPr>
+          <p:nvPr>
+            <p:ph type="title"/>
+          </p:nvPr>
+        </p:nvSpPr>
+        <p:spPr>
+          <a:xfrm>
+            <a:off x="914400" y="384048"/>
+            <a:ext cx="7772400" cy="1349502"/>
+          </a:xfrm>
+        </p:spPr>
+        <p:txBody>
+          <a:bodyPr/>
+          <a:lstStyle/>
+          <a:p>
+            <a:r>
+              <a:rPr lang="en-CA" dirty="0"/>
+              <a:t>Inheritance : Regular compile time </a:t>
+            </a:r>
+            <a:r>
+              <a:rPr lang="en-CA" dirty="0" err="1"/>
+              <a:t>NON-Polymorphic</a:t>
+            </a:r>
+            <a:endParaRPr lang="en-CA" dirty="0"/>
+          </a:p>
+        </p:txBody>
+      </p:sp>
+      <p:sp>
+        <p:nvSpPr>
+          <p:cNvPr id="3" name="Content Placeholder 2"/>
+          <p:cNvSpPr>
+            <a:spLocks noGrp="1"/>
+          </p:cNvSpPr>
+          <p:nvPr>
+            <p:ph idx="1"/>
+          </p:nvPr>
+        </p:nvSpPr>
+        <p:spPr>
+          <a:xfrm>
+            <a:off x="685800" y="1885950"/>
+            <a:ext cx="8229600" cy="2880720"/>
+          </a:xfrm>
+        </p:spPr>
+        <p:txBody>
+          <a:bodyPr>
+            <a:normAutofit/>
+          </a:bodyPr>
+          <a:lstStyle/>
+          <a:p>
+            <a:pPr lvl="1"/>
+            <a:endParaRPr lang="en-CA" dirty="0"/>
+          </a:p>
+          <a:p>
+            <a:r>
+              <a:rPr lang="en-CA" dirty="0" err="1"/>
+              <a:t>cMonster</a:t>
+            </a:r>
+            <a:r>
+              <a:rPr lang="en-CA" dirty="0"/>
+              <a:t> </a:t>
+            </a:r>
+            <a:r>
+              <a:rPr lang="en-CA" dirty="0" err="1"/>
+              <a:t>pFrank</a:t>
+            </a:r>
+            <a:endParaRPr lang="en-CA" dirty="0"/>
+          </a:p>
+          <a:p>
+            <a:r>
+              <a:rPr lang="en-CA" dirty="0" err="1"/>
+              <a:t>pFrank</a:t>
+            </a:r>
+            <a:r>
+              <a:rPr lang="en-CA" dirty="0"/>
+              <a:t>-&gt;update();	</a:t>
+            </a:r>
+          </a:p>
+          <a:p>
+            <a:pPr lvl="1"/>
+            <a:r>
+              <a:rPr lang="en-CA" dirty="0"/>
+              <a:t>Creates the code to call Update on the Monster </a:t>
+            </a:r>
+          </a:p>
+        </p:txBody>
+      </p:sp>
+      <p:sp>
+        <p:nvSpPr>
+          <p:cNvPr id="4" name="AutoShape 6"/>
+          <p:cNvSpPr>
+            <a:spLocks noChangeArrowheads="1"/>
+          </p:cNvSpPr>
+          <p:nvPr/>
+        </p:nvSpPr>
+        <p:spPr bwMode="auto">
+          <a:xfrm>
+            <a:off x="8534400" y="4800600"/>
+            <a:ext cx="609600" cy="342900"/>
+          </a:xfrm>
+          <a:prstGeom prst="rightArrow">
+            <a:avLst>
+              <a:gd name="adj1" fmla="val 50000"/>
+              <a:gd name="adj2" fmla="val 33333"/>
+            </a:avLst>
+          </a:prstGeom>
+          <a:noFill/>
+          <a:ln w="19050">
+            <a:solidFill>
+              <a:srgbClr val="969696"/>
+            </a:solidFill>
+            <a:miter lim="800000"/>
+            <a:headEnd/>
+            <a:tailEnd/>
+          </a:ln>
+        </p:spPr>
+        <p:txBody>
+          <a:bodyPr wrap="none" anchor="ctr"/>
+          <a:lstStyle/>
+          <a:p>
+            <a:endParaRPr lang="en-CA"/>
+          </a:p>
+        </p:txBody>
+      </p:sp>
+    </p:spTree>
+    <p:extLst>
+      <p:ext uri="{BB962C8B-B14F-4D97-AF65-F5344CB8AC3E}">
+        <p14:creationId xmlns:p14="http://schemas.microsoft.com/office/powerpoint/2010/main" val="1204272967"/>
+      </p:ext>
+    </p:extLst>
+  </p:cSld>
+  <p:clrMapOvr>
+    <a:masterClrMapping/>
+  </p:clrMapOvr>
+  <p:timing>
+    <p:tnLst>
+      <p:par>
+        <p:cTn id="1" dur="indefinite" restart="never" nodeType="tmRoot">
+          <p:childTnLst>
+            <p:seq concurrent="1" nextAc="seek">
+              <p:cTn id="2" dur="indefinite" nodeType="mainSeq">
+                <p:childTnLst>
+                  <p:par>
+                    <p:cTn id="3" fill="hold">
+                      <p:stCondLst>
+                        <p:cond delay="indefinite"/>
+                      </p:stCondLst>
+                      <p:childTnLst>
+                        <p:par>
+                          <p:cTn id="4" fill="hold">
+                            <p:stCondLst>
+                              <p:cond delay="0"/>
+                            </p:stCondLst>
+                            <p:childTnLst>
+                              <p:par>
+                                <p:cTn id="5" presetID="10" presetClass="entr" presetSubtype="0" fill="hold" grpId="0" nodeType="clickEffect">
+                                  <p:stCondLst>
+                                    <p:cond delay="0"/>
+                                  </p:stCondLst>
+                                  <p:childTnLst>
+                                    <p:set>
+                                      <p:cBhvr>
+                                        <p:cTn id="6" dur="1" fill="hold">
+                                          <p:stCondLst>
+                                            <p:cond delay="0"/>
+                                          </p:stCondLst>
+                                        </p:cTn>
+                                        <p:tgtEl>
+                                          <p:spTgt spid="4"/>
+                                        </p:tgtEl>
+                                        <p:attrNameLst>
+                                          <p:attrName>style.visibility</p:attrName>
+                                        </p:attrNameLst>
+                                      </p:cBhvr>
+                                      <p:to>
+                                        <p:strVal val="visible"/>
+                                      </p:to>
+                                    </p:set>
+                                    <p:animEffect transition="in" filter="fade">
+                                      <p:cBhvr>
+                                        <p:cTn id="7" dur="500"/>
+                                        <p:tgtEl>
+                                          <p:spTgt spid="4"/>
+                                        </p:tgtEl>
+                                      </p:cBhvr>
+                                    </p:animEffect>
+                                  </p:childTnLst>
+                                </p:cTn>
+                              </p:par>
+                            </p:childTnLst>
+                          </p:cTn>
+                        </p:par>
+                      </p:childTnLst>
+                    </p:cTn>
+                  </p:par>
+                </p:childTnLst>
+              </p:cTn>
+              <p:prevCondLst>
+                <p:cond evt="onPrev" delay="0">
+                  <p:tgtEl>
+                    <p:sldTgt/>
+                  </p:tgtEl>
+                </p:cond>
+              </p:prevCondLst>
+              <p:nextCondLst>
+                <p:cond evt="onNext" delay="0">
+                  <p:tgtEl>
+                    <p:sldTgt/>
+                  </p:tgtEl>
+                </p:cond>
+              </p:nextCondLst>
+            </p:seq>
+          </p:childTnLst>
+        </p:cTn>
+      </p:par>
+    </p:tnLst>
+    <p:bldLst>
+      <p:bldP spid="4" grpId="0" animBg="1"/>
+    </p:bldLst>
+  </p:timing>
+</p:sld>
+</file>
+
+<file path=ppt/slides/slide9.xml><?xml version="1.0" encoding="utf-8"?>
+<p:sld xmlns:a="http://schemas.openxmlformats.org/drawingml/2006/main" xmlns:r="http://schemas.openxmlformats.org/officeDocument/2006/relationships" xmlns:p="http://schemas.openxmlformats.org/presentationml/2006/main">
+  <p:cSld>
+    <p:spTree>
+      <p:nvGrpSpPr>
+        <p:cNvPr id="1" name=""/>
+        <p:cNvGrpSpPr/>
+        <p:nvPr/>
+      </p:nvGrpSpPr>
+      <p:grpSpPr>
+        <a:xfrm>
+          <a:off x="0" y="0"/>
+          <a:ext cx="0" cy="0"/>
+          <a:chOff x="0" y="0"/>
+          <a:chExt cx="0" cy="0"/>
+        </a:xfrm>
+      </p:grpSpPr>
+      <p:sp>
+        <p:nvSpPr>
+          <p:cNvPr id="2" name="Title 1"/>
+          <p:cNvSpPr>
+            <a:spLocks noGrp="1"/>
+          </p:cNvSpPr>
+          <p:nvPr>
+            <p:ph type="title"/>
+          </p:nvPr>
+        </p:nvSpPr>
+        <p:spPr>
+          <a:xfrm>
+            <a:off x="914400" y="384048"/>
+            <a:ext cx="7772400" cy="968502"/>
+          </a:xfrm>
+        </p:spPr>
+        <p:txBody>
+          <a:bodyPr/>
+          <a:lstStyle/>
+          <a:p>
+            <a:r>
+              <a:rPr lang="en-CA" dirty="0"/>
+              <a:t>BEWARE!</a:t>
+            </a:r>
+          </a:p>
+        </p:txBody>
+      </p:sp>
+      <p:sp>
+        <p:nvSpPr>
+          <p:cNvPr id="3" name="Content Placeholder 2"/>
+          <p:cNvSpPr>
+            <a:spLocks noGrp="1"/>
+          </p:cNvSpPr>
+          <p:nvPr>
+            <p:ph idx="1"/>
+          </p:nvPr>
+        </p:nvSpPr>
+        <p:spPr>
+          <a:xfrm>
+            <a:off x="304800" y="1428750"/>
+            <a:ext cx="8839200" cy="3337920"/>
+          </a:xfrm>
+        </p:spPr>
+        <p:txBody>
+          <a:bodyPr>
+            <a:normAutofit/>
+          </a:bodyPr>
+          <a:lstStyle/>
+          <a:p>
+            <a:r>
+              <a:rPr lang="en-CA" dirty="0"/>
+              <a:t>You can mix and match these one method at a time.</a:t>
+            </a:r>
+          </a:p>
+          <a:p>
+            <a:r>
+              <a:rPr lang="en-CA" dirty="0"/>
+              <a:t>Whatever method has “virtual” in front becomes polymorphic BUT if there’s a method that DOESN’T have “virtual”, it ISN’T polymorphic and whatever type your variable is </a:t>
+            </a:r>
+            <a:r>
+              <a:rPr lang="en-CA" dirty="0">
+                <a:sym typeface="Wingdings" panose="05000000000000000000" pitchFamily="2" charset="2"/>
+              </a:rPr>
+              <a:t> that’s the method </a:t>
+            </a:r>
+            <a:r>
+              <a:rPr lang="en-CA">
+                <a:sym typeface="Wingdings" panose="05000000000000000000" pitchFamily="2" charset="2"/>
+              </a:rPr>
+              <a:t>that’s called.</a:t>
+            </a:r>
+            <a:endParaRPr lang="en-CA" dirty="0"/>
+          </a:p>
+        </p:txBody>
+      </p:sp>
+      <p:sp>
+        <p:nvSpPr>
+          <p:cNvPr id="4" name="AutoShape 6"/>
+          <p:cNvSpPr>
+            <a:spLocks noChangeArrowheads="1"/>
+          </p:cNvSpPr>
+          <p:nvPr/>
+        </p:nvSpPr>
+        <p:spPr bwMode="auto">
+          <a:xfrm>
+            <a:off x="8534400" y="4800600"/>
+            <a:ext cx="609600" cy="342900"/>
+          </a:xfrm>
+          <a:prstGeom prst="rightArrow">
+            <a:avLst>
+              <a:gd name="adj1" fmla="val 50000"/>
+              <a:gd name="adj2" fmla="val 33333"/>
+            </a:avLst>
+          </a:prstGeom>
+          <a:noFill/>
+          <a:ln w="19050">
+            <a:solidFill>
+              <a:srgbClr val="969696"/>
+            </a:solidFill>
+            <a:miter lim="800000"/>
+            <a:headEnd/>
+            <a:tailEnd/>
+          </a:ln>
+        </p:spPr>
+        <p:txBody>
+          <a:bodyPr wrap="none" anchor="ctr"/>
+          <a:lstStyle/>
+          <a:p>
+            <a:endParaRPr lang="en-CA"/>
+          </a:p>
+        </p:txBody>
+      </p:sp>
+    </p:spTree>
+    <p:extLst>
+      <p:ext uri="{BB962C8B-B14F-4D97-AF65-F5344CB8AC3E}">
+        <p14:creationId xmlns:p14="http://schemas.microsoft.com/office/powerpoint/2010/main" val="1920560578"/>
+      </p:ext>
+    </p:extLst>
+  </p:cSld>
+  <p:clrMapOvr>
+    <a:masterClrMapping/>
+  </p:clrMapOvr>
+  <p:timing>
+    <p:tnLst>
+      <p:par>
+        <p:cTn id="1" dur="indefinite" restart="never" nodeType="tmRoot">
+          <p:childTnLst>
+            <p:seq concurrent="1" nextAc="seek">
+              <p:cTn id="2" dur="indefinite" nodeType="mainSeq">
+                <p:childTnLst>
+                  <p:par>
+                    <p:cTn id="3" fill="hold">
+                      <p:stCondLst>
+                        <p:cond delay="indefinite"/>
+                      </p:stCondLst>
+                      <p:childTnLst>
+                        <p:par>
+                          <p:cTn id="4" fill="hold">
+                            <p:stCondLst>
+                              <p:cond delay="0"/>
+                            </p:stCondLst>
+                            <p:childTnLst>
+                              <p:par>
+                                <p:cTn id="5" presetID="10" presetClass="entr" presetSubtype="0" fill="hold" grpId="0" nodeType="clickEffect">
+                                  <p:stCondLst>
+                                    <p:cond delay="0"/>
+                                  </p:stCondLst>
+                                  <p:childTnLst>
+                                    <p:set>
+                                      <p:cBhvr>
+                                        <p:cTn id="6" dur="1" fill="hold">
+                                          <p:stCondLst>
+                                            <p:cond delay="0"/>
+                                          </p:stCondLst>
+                                        </p:cTn>
+                                        <p:tgtEl>
+                                          <p:spTgt spid="4"/>
+                                        </p:tgtEl>
+                                        <p:attrNameLst>
+                                          <p:attrName>style.visibility</p:attrName>
+                                        </p:attrNameLst>
+                                      </p:cBhvr>
+                                      <p:to>
+                                        <p:strVal val="visible"/>
+                                      </p:to>
+                                    </p:set>
+                                    <p:animEffect transition="in" filter="fade">
+                                      <p:cBhvr>
+                                        <p:cTn id="7" dur="500"/>
+                                        <p:tgtEl>
+                                          <p:spTgt spid="4"/>
+                                        </p:tgtEl>
+                                      </p:cBhvr>
+                                    </p:animEffect>
+                                  </p:childTnLst>
+                                </p:cTn>
+                              </p:par>
+                            </p:childTnLst>
+                          </p:cTn>
+                        </p:par>
+                      </p:childTnLst>
+                    </p:cTn>
+                  </p:par>
+                </p:childTnLst>
+              </p:cTn>
+              <p:prevCondLst>
+                <p:cond evt="onPrev" delay="0">
+                  <p:tgtEl>
+                    <p:sldTgt/>
+                  </p:tgtEl>
+                </p:cond>
+              </p:prevCondLst>
+              <p:nextCondLst>
+                <p:cond evt="onNext" delay="0">
+                  <p:tgtEl>
+                    <p:sldTgt/>
+                  </p:tgtEl>
+                </p:cond>
+              </p:nextCondLst>
+            </p:seq>
+          </p:childTnLst>
+        </p:cTn>
+      </p:par>
+    </p:tnLst>
+    <p:bldLst>
+      <p:bldP spid="4" grpId="0" animBg="1"/>
+    </p:bldLst>
+  </p:timing>
 </p:sld>
 </file>
 

</xml_diff>